<commit_message>
updated crypto talk to latest rev
</commit_message>
<xml_diff>
--- a/talks/django-cryptography.pptx
+++ b/talks/django-cryptography.pptx
@@ -2985,7 +2985,7 @@
   <dgm:whole/>
   <dgm:extLst>
     <a:ext uri="http://schemas.microsoft.com/office/drawing/2008/diagram">
-      <dsp:dataModelExt xmlns:dsp="http://schemas.microsoft.com/office/drawing/2008/diagram" relId="rId6" minVer="http://schemas.openxmlformats.org/drawingml/2006/diagram"/>
+      <dsp:dataModelExt xmlns:dsp="http://schemas.microsoft.com/office/drawing/2008/diagram" relId="rId7" minVer="http://schemas.openxmlformats.org/drawingml/2006/diagram"/>
     </a:ext>
   </dgm:extLst>
 </dgm:dataModel>
@@ -8130,7 +8130,7 @@
           <a:bodyPr/>
           <a:lstStyle/>
           <a:p>
-            <a:endParaRPr lang="en-US"/>
+            <a:endParaRPr lang="en-US" dirty="0"/>
           </a:p>
         </p:txBody>
       </p:sp>
@@ -8161,6 +8161,1186 @@
     <p:extLst>
       <p:ext uri="{BB962C8B-B14F-4D97-AF65-F5344CB8AC3E}">
         <p14:creationId xmlns:p14="http://schemas.microsoft.com/office/powerpoint/2010/main" val="3720093397"/>
+      </p:ext>
+    </p:extLst>
+  </p:cSld>
+  <p:clrMapOvr>
+    <a:masterClrMapping/>
+  </p:clrMapOvr>
+</p:notes>
+</file>
+
+<file path=ppt/notesSlides/notesSlide10.xml><?xml version="1.0" encoding="utf-8"?>
+<p:notes xmlns:a="http://schemas.openxmlformats.org/drawingml/2006/main" xmlns:r="http://schemas.openxmlformats.org/officeDocument/2006/relationships" xmlns:p="http://schemas.openxmlformats.org/presentationml/2006/main">
+  <p:cSld>
+    <p:spTree>
+      <p:nvGrpSpPr>
+        <p:cNvPr id="1" name=""/>
+        <p:cNvGrpSpPr/>
+        <p:nvPr/>
+      </p:nvGrpSpPr>
+      <p:grpSpPr>
+        <a:xfrm>
+          <a:off x="0" y="0"/>
+          <a:ext cx="0" cy="0"/>
+          <a:chOff x="0" y="0"/>
+          <a:chExt cx="0" cy="0"/>
+        </a:xfrm>
+      </p:grpSpPr>
+      <p:sp>
+        <p:nvSpPr>
+          <p:cNvPr id="2" name="Slide Image Placeholder 1"/>
+          <p:cNvSpPr>
+            <a:spLocks noGrp="1" noRot="1" noChangeAspect="1"/>
+          </p:cNvSpPr>
+          <p:nvPr>
+            <p:ph type="sldImg"/>
+          </p:nvPr>
+        </p:nvSpPr>
+        <p:spPr/>
+      </p:sp>
+      <p:sp>
+        <p:nvSpPr>
+          <p:cNvPr id="3" name="Notes Placeholder 2"/>
+          <p:cNvSpPr>
+            <a:spLocks noGrp="1"/>
+          </p:cNvSpPr>
+          <p:nvPr>
+            <p:ph type="body" idx="1"/>
+          </p:nvPr>
+        </p:nvSpPr>
+        <p:spPr/>
+        <p:txBody>
+          <a:bodyPr/>
+          <a:lstStyle/>
+          <a:p>
+            <a:r>
+              <a:rPr lang="en-US" dirty="0" smtClean="0"/>
+              <a:t>So, just to give me a little context here, before</a:t>
+            </a:r>
+            <a:r>
+              <a:rPr lang="en-US" baseline="0" dirty="0" smtClean="0"/>
+              <a:t> I go into some background info, can I get a show of hands?</a:t>
+            </a:r>
+            <a:endParaRPr lang="en-US" dirty="0"/>
+          </a:p>
+        </p:txBody>
+      </p:sp>
+      <p:sp>
+        <p:nvSpPr>
+          <p:cNvPr id="4" name="Slide Number Placeholder 3"/>
+          <p:cNvSpPr>
+            <a:spLocks noGrp="1"/>
+          </p:cNvSpPr>
+          <p:nvPr>
+            <p:ph type="sldNum" sz="quarter" idx="10"/>
+          </p:nvPr>
+        </p:nvSpPr>
+        <p:spPr/>
+        <p:txBody>
+          <a:bodyPr/>
+          <a:lstStyle/>
+          <a:p>
+            <a:fld id="{ABEEAED5-6BB0-3543-A175-5FEF91939696}" type="slidenum">
+              <a:rPr lang="en-US" smtClean="0"/>
+              <a:t>10</a:t>
+            </a:fld>
+            <a:endParaRPr lang="en-US"/>
+          </a:p>
+        </p:txBody>
+      </p:sp>
+    </p:spTree>
+    <p:extLst>
+      <p:ext uri="{BB962C8B-B14F-4D97-AF65-F5344CB8AC3E}">
+        <p14:creationId xmlns:p14="http://schemas.microsoft.com/office/powerpoint/2010/main" val="3914177574"/>
+      </p:ext>
+    </p:extLst>
+  </p:cSld>
+  <p:clrMapOvr>
+    <a:masterClrMapping/>
+  </p:clrMapOvr>
+</p:notes>
+</file>
+
+<file path=ppt/notesSlides/notesSlide11.xml><?xml version="1.0" encoding="utf-8"?>
+<p:notes xmlns:a="http://schemas.openxmlformats.org/drawingml/2006/main" xmlns:r="http://schemas.openxmlformats.org/officeDocument/2006/relationships" xmlns:p="http://schemas.openxmlformats.org/presentationml/2006/main">
+  <p:cSld>
+    <p:spTree>
+      <p:nvGrpSpPr>
+        <p:cNvPr id="1" name=""/>
+        <p:cNvGrpSpPr/>
+        <p:nvPr/>
+      </p:nvGrpSpPr>
+      <p:grpSpPr>
+        <a:xfrm>
+          <a:off x="0" y="0"/>
+          <a:ext cx="0" cy="0"/>
+          <a:chOff x="0" y="0"/>
+          <a:chExt cx="0" cy="0"/>
+        </a:xfrm>
+      </p:grpSpPr>
+      <p:sp>
+        <p:nvSpPr>
+          <p:cNvPr id="2" name="Slide Image Placeholder 1"/>
+          <p:cNvSpPr>
+            <a:spLocks noGrp="1" noRot="1" noChangeAspect="1"/>
+          </p:cNvSpPr>
+          <p:nvPr>
+            <p:ph type="sldImg"/>
+          </p:nvPr>
+        </p:nvSpPr>
+        <p:spPr/>
+      </p:sp>
+      <p:sp>
+        <p:nvSpPr>
+          <p:cNvPr id="3" name="Notes Placeholder 2"/>
+          <p:cNvSpPr>
+            <a:spLocks noGrp="1"/>
+          </p:cNvSpPr>
+          <p:nvPr>
+            <p:ph type="body" idx="1"/>
+          </p:nvPr>
+        </p:nvSpPr>
+        <p:spPr/>
+        <p:txBody>
+          <a:bodyPr/>
+          <a:lstStyle/>
+          <a:p>
+            <a:r>
+              <a:rPr lang="en-US" dirty="0" smtClean="0"/>
+              <a:t>I</a:t>
+            </a:r>
+            <a:r>
+              <a:rPr lang="en-US" baseline="0" dirty="0" smtClean="0"/>
+              <a:t> had a few “CISSP 101” slides in here but I cut them down to one. And this one has a cartoon. You can thank me later. </a:t>
+            </a:r>
+          </a:p>
+          <a:p>
+            <a:endParaRPr lang="en-US" baseline="0" dirty="0" smtClean="0"/>
+          </a:p>
+          <a:p>
+            <a:r>
+              <a:rPr lang="en-US" baseline="0" dirty="0" smtClean="0"/>
+              <a:t>The cartoon says “All I’m saying is NOW is the time to develop the technology to deflect an asteroid”. That’s basically the point of risk analysis. You need to be AHEAD of the game.</a:t>
+            </a:r>
+          </a:p>
+          <a:p>
+            <a:endParaRPr lang="en-US" baseline="0" dirty="0" smtClean="0"/>
+          </a:p>
+          <a:p>
+            <a:r>
+              <a:rPr lang="en-US" baseline="0" dirty="0" smtClean="0"/>
+              <a:t>If you’re writing code on the internet, you need to be thinking in terms of analyzing your risks. If you’re not subject to regulator compliance, you don’t necessary have to document it, but you should still be thinking about your risk exposure. It will give you context that will help you determine what controls you can afford to implement.</a:t>
+            </a:r>
+          </a:p>
+          <a:p>
+            <a:endParaRPr lang="en-US" baseline="0" dirty="0" smtClean="0"/>
+          </a:p>
+          <a:p>
+            <a:r>
+              <a:rPr lang="en-US" baseline="0" dirty="0" smtClean="0"/>
+              <a:t>Risk analysis isn’t necessarily easy, but it’s pretty simple.</a:t>
+            </a:r>
+          </a:p>
+          <a:p>
+            <a:endParaRPr lang="en-US" baseline="0" dirty="0" smtClean="0"/>
+          </a:p>
+          <a:p>
+            <a:r>
+              <a:rPr lang="en-US" baseline="0" dirty="0" smtClean="0"/>
+              <a:t>First, figure out what you’re trying to protect. Think of terms of things you don’t want to lose, and things that other people might want. </a:t>
+            </a:r>
+          </a:p>
+          <a:p>
+            <a:endParaRPr lang="en-US" baseline="0" dirty="0" smtClean="0"/>
+          </a:p>
+          <a:p>
+            <a:r>
+              <a:rPr lang="en-US" baseline="0" dirty="0" smtClean="0"/>
+              <a:t>Then, identify your threats and vulnerabilities. So you have a main system database with a bunch of user passwords. Do people want it? How might they get it? Accidentally restoring a backup? Losing a laptop? Hacking into your system? </a:t>
+            </a:r>
+            <a:r>
+              <a:rPr lang="en-US" baseline="0" dirty="0" err="1" smtClean="0"/>
+              <a:t>Wifi</a:t>
+            </a:r>
+            <a:r>
+              <a:rPr lang="en-US" baseline="0" dirty="0" smtClean="0"/>
+              <a:t> sniffing? What about a disgruntled employee who quits and issues an </a:t>
+            </a:r>
+            <a:r>
+              <a:rPr lang="en-US" baseline="0" dirty="0" err="1" smtClean="0"/>
+              <a:t>rm</a:t>
+            </a:r>
+            <a:r>
+              <a:rPr lang="en-US" baseline="0" dirty="0" smtClean="0"/>
+              <a:t> –</a:t>
+            </a:r>
+            <a:r>
+              <a:rPr lang="en-US" baseline="0" dirty="0" err="1" smtClean="0"/>
+              <a:t>rf</a:t>
+            </a:r>
+            <a:r>
+              <a:rPr lang="en-US" baseline="0" dirty="0" smtClean="0"/>
+              <a:t> on their way out the door?</a:t>
+            </a:r>
+          </a:p>
+          <a:p>
+            <a:endParaRPr lang="en-US" baseline="0" dirty="0" smtClean="0"/>
+          </a:p>
+          <a:p>
+            <a:r>
+              <a:rPr lang="en-US" baseline="0" dirty="0" smtClean="0"/>
+              <a:t>Finally, identify which of these vulnerabilities need to be countered. Chances are you have a few decent controls already (</a:t>
+            </a:r>
+            <a:r>
+              <a:rPr lang="en-US" baseline="0" dirty="0" err="1" smtClean="0"/>
+              <a:t>ssh</a:t>
+            </a:r>
+            <a:r>
+              <a:rPr lang="en-US" baseline="0" dirty="0" smtClean="0"/>
+              <a:t> administrative access, firewalls, running your app as a non-privileged user, separate database users).</a:t>
+            </a:r>
+          </a:p>
+          <a:p>
+            <a:endParaRPr lang="en-US" baseline="0" dirty="0" smtClean="0"/>
+          </a:p>
+          <a:p>
+            <a:r>
+              <a:rPr lang="en-US" baseline="0" dirty="0" smtClean="0"/>
+              <a:t>Anyway, you may well determine you need some cryptography to keep things copacetic. Let’s look at what’s on the table.</a:t>
+            </a:r>
+            <a:endParaRPr lang="en-US" dirty="0"/>
+          </a:p>
+        </p:txBody>
+      </p:sp>
+      <p:sp>
+        <p:nvSpPr>
+          <p:cNvPr id="4" name="Slide Number Placeholder 3"/>
+          <p:cNvSpPr>
+            <a:spLocks noGrp="1"/>
+          </p:cNvSpPr>
+          <p:nvPr>
+            <p:ph type="sldNum" sz="quarter" idx="10"/>
+          </p:nvPr>
+        </p:nvSpPr>
+        <p:spPr/>
+        <p:txBody>
+          <a:bodyPr/>
+          <a:lstStyle/>
+          <a:p>
+            <a:fld id="{ABEEAED5-6BB0-3543-A175-5FEF91939696}" type="slidenum">
+              <a:rPr lang="en-US" smtClean="0"/>
+              <a:t>11</a:t>
+            </a:fld>
+            <a:endParaRPr lang="en-US"/>
+          </a:p>
+        </p:txBody>
+      </p:sp>
+    </p:spTree>
+    <p:extLst>
+      <p:ext uri="{BB962C8B-B14F-4D97-AF65-F5344CB8AC3E}">
+        <p14:creationId xmlns:p14="http://schemas.microsoft.com/office/powerpoint/2010/main" val="269052732"/>
+      </p:ext>
+    </p:extLst>
+  </p:cSld>
+  <p:clrMapOvr>
+    <a:masterClrMapping/>
+  </p:clrMapOvr>
+</p:notes>
+</file>
+
+<file path=ppt/notesSlides/notesSlide12.xml><?xml version="1.0" encoding="utf-8"?>
+<p:notes xmlns:a="http://schemas.openxmlformats.org/drawingml/2006/main" xmlns:r="http://schemas.openxmlformats.org/officeDocument/2006/relationships" xmlns:p="http://schemas.openxmlformats.org/presentationml/2006/main">
+  <p:cSld>
+    <p:spTree>
+      <p:nvGrpSpPr>
+        <p:cNvPr id="1" name=""/>
+        <p:cNvGrpSpPr/>
+        <p:nvPr/>
+      </p:nvGrpSpPr>
+      <p:grpSpPr>
+        <a:xfrm>
+          <a:off x="0" y="0"/>
+          <a:ext cx="0" cy="0"/>
+          <a:chOff x="0" y="0"/>
+          <a:chExt cx="0" cy="0"/>
+        </a:xfrm>
+      </p:grpSpPr>
+      <p:sp>
+        <p:nvSpPr>
+          <p:cNvPr id="2" name="Slide Image Placeholder 1"/>
+          <p:cNvSpPr>
+            <a:spLocks noGrp="1" noRot="1" noChangeAspect="1"/>
+          </p:cNvSpPr>
+          <p:nvPr>
+            <p:ph type="sldImg"/>
+          </p:nvPr>
+        </p:nvSpPr>
+        <p:spPr/>
+      </p:sp>
+      <p:sp>
+        <p:nvSpPr>
+          <p:cNvPr id="3" name="Notes Placeholder 2"/>
+          <p:cNvSpPr>
+            <a:spLocks noGrp="1"/>
+          </p:cNvSpPr>
+          <p:nvPr>
+            <p:ph type="body" idx="1"/>
+          </p:nvPr>
+        </p:nvSpPr>
+        <p:spPr/>
+        <p:txBody>
+          <a:bodyPr/>
+          <a:lstStyle/>
+          <a:p>
+            <a:pPr marL="0" indent="0">
+              <a:buFont typeface="Arial"/>
+              <a:buNone/>
+            </a:pPr>
+            <a:r>
+              <a:rPr lang="en-US" dirty="0" smtClean="0"/>
+              <a:t>So,</a:t>
+            </a:r>
+            <a:r>
+              <a:rPr lang="en-US" baseline="0" dirty="0" smtClean="0"/>
+              <a:t> what’s cryptography. Well, it’s a pretty robust field, but in the context of a web or </a:t>
+            </a:r>
+            <a:r>
+              <a:rPr lang="en-US" baseline="0" dirty="0" err="1" smtClean="0"/>
+              <a:t>django</a:t>
+            </a:r>
+            <a:r>
+              <a:rPr lang="en-US" baseline="0" dirty="0" smtClean="0"/>
+              <a:t> application, it basically breaks down to three things. The first of these are cryptographic hash functions. At least on the surface, they’re pretty simple. Take a “thing”, preferably large, and represent it with a fixed string of bytes.</a:t>
+            </a:r>
+          </a:p>
+          <a:p>
+            <a:pPr marL="0" indent="0">
+              <a:buFont typeface="Arial"/>
+              <a:buNone/>
+            </a:pPr>
+            <a:endParaRPr lang="en-US" dirty="0" smtClean="0"/>
+          </a:p>
+          <a:p>
+            <a:pPr marL="285750" indent="-285750">
+              <a:buFont typeface="Arial"/>
+              <a:buChar char="•"/>
+            </a:pPr>
+            <a:r>
+              <a:rPr lang="en-US" dirty="0" smtClean="0"/>
+              <a:t>No </a:t>
+            </a:r>
+            <a:r>
+              <a:rPr lang="en-US" dirty="0" smtClean="0"/>
+              <a:t>Keys</a:t>
+            </a:r>
+          </a:p>
+          <a:p>
+            <a:pPr marL="285750" indent="-285750">
+              <a:buFont typeface="Arial"/>
+              <a:buChar char="•"/>
+            </a:pPr>
+            <a:r>
+              <a:rPr lang="en-US" dirty="0" smtClean="0"/>
+              <a:t>One way (destroys data)</a:t>
+            </a:r>
+          </a:p>
+          <a:p>
+            <a:pPr marL="285750" indent="-285750">
+              <a:buFont typeface="Arial"/>
+              <a:buChar char="•"/>
+            </a:pPr>
+            <a:r>
+              <a:rPr lang="en-US" dirty="0" smtClean="0"/>
+              <a:t>Comparatively fast (still not ideal for hash tables)</a:t>
+            </a:r>
+          </a:p>
+          <a:p>
+            <a:endParaRPr lang="en-US" dirty="0"/>
+          </a:p>
+        </p:txBody>
+      </p:sp>
+      <p:sp>
+        <p:nvSpPr>
+          <p:cNvPr id="4" name="Slide Number Placeholder 3"/>
+          <p:cNvSpPr>
+            <a:spLocks noGrp="1"/>
+          </p:cNvSpPr>
+          <p:nvPr>
+            <p:ph type="sldNum" sz="quarter" idx="10"/>
+          </p:nvPr>
+        </p:nvSpPr>
+        <p:spPr/>
+        <p:txBody>
+          <a:bodyPr/>
+          <a:lstStyle/>
+          <a:p>
+            <a:fld id="{ABEEAED5-6BB0-3543-A175-5FEF91939696}" type="slidenum">
+              <a:rPr lang="en-US" smtClean="0"/>
+              <a:t>12</a:t>
+            </a:fld>
+            <a:endParaRPr lang="en-US"/>
+          </a:p>
+        </p:txBody>
+      </p:sp>
+    </p:spTree>
+    <p:extLst>
+      <p:ext uri="{BB962C8B-B14F-4D97-AF65-F5344CB8AC3E}">
+        <p14:creationId xmlns:p14="http://schemas.microsoft.com/office/powerpoint/2010/main" val="206127257"/>
+      </p:ext>
+    </p:extLst>
+  </p:cSld>
+  <p:clrMapOvr>
+    <a:masterClrMapping/>
+  </p:clrMapOvr>
+</p:notes>
+</file>
+
+<file path=ppt/notesSlides/notesSlide13.xml><?xml version="1.0" encoding="utf-8"?>
+<p:notes xmlns:a="http://schemas.openxmlformats.org/drawingml/2006/main" xmlns:r="http://schemas.openxmlformats.org/officeDocument/2006/relationships" xmlns:p="http://schemas.openxmlformats.org/presentationml/2006/main">
+  <p:cSld>
+    <p:spTree>
+      <p:nvGrpSpPr>
+        <p:cNvPr id="1" name=""/>
+        <p:cNvGrpSpPr/>
+        <p:nvPr/>
+      </p:nvGrpSpPr>
+      <p:grpSpPr>
+        <a:xfrm>
+          <a:off x="0" y="0"/>
+          <a:ext cx="0" cy="0"/>
+          <a:chOff x="0" y="0"/>
+          <a:chExt cx="0" cy="0"/>
+        </a:xfrm>
+      </p:grpSpPr>
+      <p:sp>
+        <p:nvSpPr>
+          <p:cNvPr id="2" name="Slide Image Placeholder 1"/>
+          <p:cNvSpPr>
+            <a:spLocks noGrp="1" noRot="1" noChangeAspect="1"/>
+          </p:cNvSpPr>
+          <p:nvPr>
+            <p:ph type="sldImg"/>
+          </p:nvPr>
+        </p:nvSpPr>
+        <p:spPr/>
+      </p:sp>
+      <p:sp>
+        <p:nvSpPr>
+          <p:cNvPr id="3" name="Notes Placeholder 2"/>
+          <p:cNvSpPr>
+            <a:spLocks noGrp="1"/>
+          </p:cNvSpPr>
+          <p:nvPr>
+            <p:ph type="body" idx="1"/>
+          </p:nvPr>
+        </p:nvSpPr>
+        <p:spPr/>
+        <p:txBody>
+          <a:bodyPr/>
+          <a:lstStyle/>
+          <a:p>
+            <a:r>
+              <a:rPr lang="en-US" dirty="0" smtClean="0"/>
+              <a:t>The 2</a:t>
+            </a:r>
+            <a:r>
+              <a:rPr lang="en-US" baseline="30000" dirty="0" smtClean="0"/>
+              <a:t>nd</a:t>
+            </a:r>
+            <a:r>
+              <a:rPr lang="en-US" baseline="0" dirty="0" smtClean="0"/>
+              <a:t> class of cryptography you’ll run into frequently is symmetric key encryption. This is simple, reversible encryption. Obviously, the devil is in the details, but you can actually make an unbreakable cipher simply by using an old fashioned one-time pad. With symmetric encryption, you have only one key, which is used for both encryption. That means you have to share it with anybody else you want to share with.</a:t>
+            </a:r>
+            <a:endParaRPr lang="en-US" dirty="0"/>
+          </a:p>
+        </p:txBody>
+      </p:sp>
+      <p:sp>
+        <p:nvSpPr>
+          <p:cNvPr id="4" name="Slide Number Placeholder 3"/>
+          <p:cNvSpPr>
+            <a:spLocks noGrp="1"/>
+          </p:cNvSpPr>
+          <p:nvPr>
+            <p:ph type="sldNum" sz="quarter" idx="10"/>
+          </p:nvPr>
+        </p:nvSpPr>
+        <p:spPr/>
+        <p:txBody>
+          <a:bodyPr/>
+          <a:lstStyle/>
+          <a:p>
+            <a:fld id="{ABEEAED5-6BB0-3543-A175-5FEF91939696}" type="slidenum">
+              <a:rPr lang="en-US" smtClean="0"/>
+              <a:t>14</a:t>
+            </a:fld>
+            <a:endParaRPr lang="en-US"/>
+          </a:p>
+        </p:txBody>
+      </p:sp>
+    </p:spTree>
+    <p:extLst>
+      <p:ext uri="{BB962C8B-B14F-4D97-AF65-F5344CB8AC3E}">
+        <p14:creationId xmlns:p14="http://schemas.microsoft.com/office/powerpoint/2010/main" val="448987607"/>
+      </p:ext>
+    </p:extLst>
+  </p:cSld>
+  <p:clrMapOvr>
+    <a:masterClrMapping/>
+  </p:clrMapOvr>
+</p:notes>
+</file>
+
+<file path=ppt/notesSlides/notesSlide14.xml><?xml version="1.0" encoding="utf-8"?>
+<p:notes xmlns:a="http://schemas.openxmlformats.org/drawingml/2006/main" xmlns:r="http://schemas.openxmlformats.org/officeDocument/2006/relationships" xmlns:p="http://schemas.openxmlformats.org/presentationml/2006/main">
+  <p:cSld>
+    <p:spTree>
+      <p:nvGrpSpPr>
+        <p:cNvPr id="1" name=""/>
+        <p:cNvGrpSpPr/>
+        <p:nvPr/>
+      </p:nvGrpSpPr>
+      <p:grpSpPr>
+        <a:xfrm>
+          <a:off x="0" y="0"/>
+          <a:ext cx="0" cy="0"/>
+          <a:chOff x="0" y="0"/>
+          <a:chExt cx="0" cy="0"/>
+        </a:xfrm>
+      </p:grpSpPr>
+      <p:sp>
+        <p:nvSpPr>
+          <p:cNvPr id="2" name="Slide Image Placeholder 1"/>
+          <p:cNvSpPr>
+            <a:spLocks noGrp="1" noRot="1" noChangeAspect="1"/>
+          </p:cNvSpPr>
+          <p:nvPr>
+            <p:ph type="sldImg"/>
+          </p:nvPr>
+        </p:nvSpPr>
+        <p:spPr/>
+      </p:sp>
+      <p:sp>
+        <p:nvSpPr>
+          <p:cNvPr id="3" name="Notes Placeholder 2"/>
+          <p:cNvSpPr>
+            <a:spLocks noGrp="1"/>
+          </p:cNvSpPr>
+          <p:nvPr>
+            <p:ph type="body" idx="1"/>
+          </p:nvPr>
+        </p:nvSpPr>
+        <p:spPr/>
+        <p:txBody>
+          <a:bodyPr/>
+          <a:lstStyle/>
+          <a:p>
+            <a:endParaRPr lang="en-US" dirty="0"/>
+          </a:p>
+        </p:txBody>
+      </p:sp>
+      <p:sp>
+        <p:nvSpPr>
+          <p:cNvPr id="4" name="Slide Number Placeholder 3"/>
+          <p:cNvSpPr>
+            <a:spLocks noGrp="1"/>
+          </p:cNvSpPr>
+          <p:nvPr>
+            <p:ph type="sldNum" sz="quarter" idx="10"/>
+          </p:nvPr>
+        </p:nvSpPr>
+        <p:spPr/>
+        <p:txBody>
+          <a:bodyPr/>
+          <a:lstStyle/>
+          <a:p>
+            <a:fld id="{ABEEAED5-6BB0-3543-A175-5FEF91939696}" type="slidenum">
+              <a:rPr lang="en-US" smtClean="0"/>
+              <a:t>15</a:t>
+            </a:fld>
+            <a:endParaRPr lang="en-US"/>
+          </a:p>
+        </p:txBody>
+      </p:sp>
+    </p:spTree>
+    <p:extLst>
+      <p:ext uri="{BB962C8B-B14F-4D97-AF65-F5344CB8AC3E}">
+        <p14:creationId xmlns:p14="http://schemas.microsoft.com/office/powerpoint/2010/main" val="304369992"/>
+      </p:ext>
+    </p:extLst>
+  </p:cSld>
+  <p:clrMapOvr>
+    <a:masterClrMapping/>
+  </p:clrMapOvr>
+</p:notes>
+</file>
+
+<file path=ppt/notesSlides/notesSlide15.xml><?xml version="1.0" encoding="utf-8"?>
+<p:notes xmlns:a="http://schemas.openxmlformats.org/drawingml/2006/main" xmlns:r="http://schemas.openxmlformats.org/officeDocument/2006/relationships" xmlns:p="http://schemas.openxmlformats.org/presentationml/2006/main">
+  <p:cSld>
+    <p:spTree>
+      <p:nvGrpSpPr>
+        <p:cNvPr id="1" name=""/>
+        <p:cNvGrpSpPr/>
+        <p:nvPr/>
+      </p:nvGrpSpPr>
+      <p:grpSpPr>
+        <a:xfrm>
+          <a:off x="0" y="0"/>
+          <a:ext cx="0" cy="0"/>
+          <a:chOff x="0" y="0"/>
+          <a:chExt cx="0" cy="0"/>
+        </a:xfrm>
+      </p:grpSpPr>
+      <p:sp>
+        <p:nvSpPr>
+          <p:cNvPr id="2" name="Slide Image Placeholder 1"/>
+          <p:cNvSpPr>
+            <a:spLocks noGrp="1" noRot="1" noChangeAspect="1"/>
+          </p:cNvSpPr>
+          <p:nvPr>
+            <p:ph type="sldImg"/>
+          </p:nvPr>
+        </p:nvSpPr>
+        <p:spPr/>
+      </p:sp>
+      <p:sp>
+        <p:nvSpPr>
+          <p:cNvPr id="3" name="Notes Placeholder 2"/>
+          <p:cNvSpPr>
+            <a:spLocks noGrp="1"/>
+          </p:cNvSpPr>
+          <p:nvPr>
+            <p:ph type="body" idx="1"/>
+          </p:nvPr>
+        </p:nvSpPr>
+        <p:spPr/>
+        <p:txBody>
+          <a:bodyPr/>
+          <a:lstStyle/>
+          <a:p>
+            <a:r>
+              <a:rPr lang="en-US" dirty="0" smtClean="0"/>
+              <a:t>Finally, the last “class” of cryptography we’re going to talk about is public key cryptography. It’s a pretty big breakthrough in crypto, in </a:t>
+            </a:r>
+            <a:r>
+              <a:rPr lang="en-US" baseline="0" dirty="0" smtClean="0"/>
+              <a:t>that it allows for asymmetric trust. Bob can give Alice a copy of his “public key” and she can send messages to bob that only he can decrypt. If he chooses, he can use Alice’s public key to verify that she was actually the sender. Obviously, this works both ways.</a:t>
+            </a:r>
+          </a:p>
+          <a:p>
+            <a:endParaRPr lang="en-US" baseline="0" dirty="0" smtClean="0"/>
+          </a:p>
+        </p:txBody>
+      </p:sp>
+      <p:sp>
+        <p:nvSpPr>
+          <p:cNvPr id="4" name="Slide Number Placeholder 3"/>
+          <p:cNvSpPr>
+            <a:spLocks noGrp="1"/>
+          </p:cNvSpPr>
+          <p:nvPr>
+            <p:ph type="sldNum" sz="quarter" idx="10"/>
+          </p:nvPr>
+        </p:nvSpPr>
+        <p:spPr/>
+        <p:txBody>
+          <a:bodyPr/>
+          <a:lstStyle/>
+          <a:p>
+            <a:fld id="{ABEEAED5-6BB0-3543-A175-5FEF91939696}" type="slidenum">
+              <a:rPr lang="en-US" smtClean="0"/>
+              <a:t>16</a:t>
+            </a:fld>
+            <a:endParaRPr lang="en-US"/>
+          </a:p>
+        </p:txBody>
+      </p:sp>
+    </p:spTree>
+    <p:extLst>
+      <p:ext uri="{BB962C8B-B14F-4D97-AF65-F5344CB8AC3E}">
+        <p14:creationId xmlns:p14="http://schemas.microsoft.com/office/powerpoint/2010/main" val="3721009001"/>
+      </p:ext>
+    </p:extLst>
+  </p:cSld>
+  <p:clrMapOvr>
+    <a:masterClrMapping/>
+  </p:clrMapOvr>
+</p:notes>
+</file>
+
+<file path=ppt/notesSlides/notesSlide16.xml><?xml version="1.0" encoding="utf-8"?>
+<p:notes xmlns:a="http://schemas.openxmlformats.org/drawingml/2006/main" xmlns:r="http://schemas.openxmlformats.org/officeDocument/2006/relationships" xmlns:p="http://schemas.openxmlformats.org/presentationml/2006/main">
+  <p:cSld>
+    <p:spTree>
+      <p:nvGrpSpPr>
+        <p:cNvPr id="1" name=""/>
+        <p:cNvGrpSpPr/>
+        <p:nvPr/>
+      </p:nvGrpSpPr>
+      <p:grpSpPr>
+        <a:xfrm>
+          <a:off x="0" y="0"/>
+          <a:ext cx="0" cy="0"/>
+          <a:chOff x="0" y="0"/>
+          <a:chExt cx="0" cy="0"/>
+        </a:xfrm>
+      </p:grpSpPr>
+      <p:sp>
+        <p:nvSpPr>
+          <p:cNvPr id="2" name="Slide Image Placeholder 1"/>
+          <p:cNvSpPr>
+            <a:spLocks noGrp="1" noRot="1" noChangeAspect="1"/>
+          </p:cNvSpPr>
+          <p:nvPr>
+            <p:ph type="sldImg"/>
+          </p:nvPr>
+        </p:nvSpPr>
+        <p:spPr/>
+      </p:sp>
+      <p:sp>
+        <p:nvSpPr>
+          <p:cNvPr id="3" name="Notes Placeholder 2"/>
+          <p:cNvSpPr>
+            <a:spLocks noGrp="1"/>
+          </p:cNvSpPr>
+          <p:nvPr>
+            <p:ph type="body" idx="1"/>
+          </p:nvPr>
+        </p:nvSpPr>
+        <p:spPr/>
+        <p:txBody>
+          <a:bodyPr/>
+          <a:lstStyle/>
+          <a:p>
+            <a:pPr marL="0" marR="0" indent="0" algn="l" defTabSz="457200" rtl="0" eaLnBrk="1" fontAlgn="auto" latinLnBrk="0" hangingPunct="1">
+              <a:lnSpc>
+                <a:spcPct val="100000"/>
+              </a:lnSpc>
+              <a:spcBef>
+                <a:spcPts val="0"/>
+              </a:spcBef>
+              <a:spcAft>
+                <a:spcPts val="0"/>
+              </a:spcAft>
+              <a:buClrTx/>
+              <a:buSzTx/>
+              <a:buFontTx/>
+              <a:buNone/>
+              <a:tabLst/>
+              <a:defRPr/>
+            </a:pPr>
+            <a:r>
+              <a:rPr lang="en-US" dirty="0" smtClean="0"/>
+              <a:t>The fundamental premise of PKC is that there are</a:t>
+            </a:r>
+            <a:r>
+              <a:rPr lang="en-US" baseline="0" dirty="0" smtClean="0"/>
+              <a:t> mathematical problems which are much harder to reverse than they are to compute. RSA uses determining prime factors, DSA uses exponentiation and logarithms.</a:t>
+            </a:r>
+            <a:endParaRPr lang="en-US" dirty="0" smtClean="0"/>
+          </a:p>
+          <a:p>
+            <a:endParaRPr lang="en-US" dirty="0"/>
+          </a:p>
+        </p:txBody>
+      </p:sp>
+      <p:sp>
+        <p:nvSpPr>
+          <p:cNvPr id="4" name="Slide Number Placeholder 3"/>
+          <p:cNvSpPr>
+            <a:spLocks noGrp="1"/>
+          </p:cNvSpPr>
+          <p:nvPr>
+            <p:ph type="sldNum" sz="quarter" idx="10"/>
+          </p:nvPr>
+        </p:nvSpPr>
+        <p:spPr/>
+        <p:txBody>
+          <a:bodyPr/>
+          <a:lstStyle/>
+          <a:p>
+            <a:fld id="{ABEEAED5-6BB0-3543-A175-5FEF91939696}" type="slidenum">
+              <a:rPr lang="en-US" smtClean="0"/>
+              <a:t>17</a:t>
+            </a:fld>
+            <a:endParaRPr lang="en-US"/>
+          </a:p>
+        </p:txBody>
+      </p:sp>
+    </p:spTree>
+    <p:extLst>
+      <p:ext uri="{BB962C8B-B14F-4D97-AF65-F5344CB8AC3E}">
+        <p14:creationId xmlns:p14="http://schemas.microsoft.com/office/powerpoint/2010/main" val="3407841517"/>
+      </p:ext>
+    </p:extLst>
+  </p:cSld>
+  <p:clrMapOvr>
+    <a:masterClrMapping/>
+  </p:clrMapOvr>
+</p:notes>
+</file>
+
+<file path=ppt/notesSlides/notesSlide17.xml><?xml version="1.0" encoding="utf-8"?>
+<p:notes xmlns:a="http://schemas.openxmlformats.org/drawingml/2006/main" xmlns:r="http://schemas.openxmlformats.org/officeDocument/2006/relationships" xmlns:p="http://schemas.openxmlformats.org/presentationml/2006/main">
+  <p:cSld>
+    <p:spTree>
+      <p:nvGrpSpPr>
+        <p:cNvPr id="1" name=""/>
+        <p:cNvGrpSpPr/>
+        <p:nvPr/>
+      </p:nvGrpSpPr>
+      <p:grpSpPr>
+        <a:xfrm>
+          <a:off x="0" y="0"/>
+          <a:ext cx="0" cy="0"/>
+          <a:chOff x="0" y="0"/>
+          <a:chExt cx="0" cy="0"/>
+        </a:xfrm>
+      </p:grpSpPr>
+      <p:sp>
+        <p:nvSpPr>
+          <p:cNvPr id="2" name="Slide Image Placeholder 1"/>
+          <p:cNvSpPr>
+            <a:spLocks noGrp="1" noRot="1" noChangeAspect="1"/>
+          </p:cNvSpPr>
+          <p:nvPr>
+            <p:ph type="sldImg"/>
+          </p:nvPr>
+        </p:nvSpPr>
+        <p:spPr/>
+      </p:sp>
+      <p:sp>
+        <p:nvSpPr>
+          <p:cNvPr id="3" name="Notes Placeholder 2"/>
+          <p:cNvSpPr>
+            <a:spLocks noGrp="1"/>
+          </p:cNvSpPr>
+          <p:nvPr>
+            <p:ph type="body" idx="1"/>
+          </p:nvPr>
+        </p:nvSpPr>
+        <p:spPr/>
+        <p:txBody>
+          <a:bodyPr/>
+          <a:lstStyle/>
+          <a:p>
+            <a:pPr marL="0" marR="0" indent="0" algn="l" defTabSz="457200" rtl="0" eaLnBrk="1" fontAlgn="auto" latinLnBrk="0" hangingPunct="1">
+              <a:lnSpc>
+                <a:spcPct val="100000"/>
+              </a:lnSpc>
+              <a:spcBef>
+                <a:spcPts val="0"/>
+              </a:spcBef>
+              <a:spcAft>
+                <a:spcPts val="0"/>
+              </a:spcAft>
+              <a:buClrTx/>
+              <a:buSzTx/>
+              <a:buFontTx/>
+              <a:buNone/>
+              <a:tabLst/>
+              <a:defRPr/>
+            </a:pPr>
+            <a:r>
+              <a:rPr lang="en-US" dirty="0" smtClean="0"/>
+              <a:t>So we’ve talked about the tools on the table. Let’s level set on some basic best practice. </a:t>
+            </a:r>
+            <a:r>
+              <a:rPr lang="en-US" dirty="0" smtClean="0"/>
+              <a:t>I don’t claim to be an authority here, so feel free to add to the list. </a:t>
+            </a:r>
+          </a:p>
+          <a:p>
+            <a:endParaRPr lang="en-US" dirty="0" smtClean="0"/>
+          </a:p>
+          <a:p>
+            <a:r>
+              <a:rPr lang="en-US" dirty="0" smtClean="0"/>
+              <a:t>This is the stuff you shouldn’t be writing in any</a:t>
+            </a:r>
+            <a:r>
+              <a:rPr lang="en-US" baseline="0" dirty="0" smtClean="0"/>
+              <a:t> way, shape or form. This is why you use a framework.</a:t>
+            </a:r>
+            <a:r>
+              <a:rPr lang="en-US" dirty="0" smtClean="0"/>
+              <a:t> </a:t>
+            </a:r>
+          </a:p>
+          <a:p>
+            <a:r>
+              <a:rPr lang="en-US" dirty="0" smtClean="0"/>
+              <a:t>I can</a:t>
+            </a:r>
+            <a:r>
+              <a:rPr lang="en-US" baseline="0" dirty="0" smtClean="0"/>
+              <a:t> say, however, that looking over the crypto-related code in Django 1.4, things have improved a lot. </a:t>
+            </a:r>
+            <a:r>
+              <a:rPr lang="en-US" baseline="0" dirty="0" err="1" smtClean="0"/>
+              <a:t>Kudo’s</a:t>
+            </a:r>
+            <a:r>
+              <a:rPr lang="en-US" baseline="0" dirty="0" smtClean="0"/>
+              <a:t> to whoever was responsible. Use Django 1.4.</a:t>
+            </a:r>
+          </a:p>
+          <a:p>
+            <a:endParaRPr lang="en-US" baseline="0" dirty="0" smtClean="0"/>
+          </a:p>
+          <a:p>
+            <a:r>
+              <a:rPr lang="en-US" baseline="0" dirty="0" smtClean="0"/>
+              <a:t>Secondly. Enable HTTPS. Just do it. Force redirects, and use secure cookies. </a:t>
+            </a:r>
+          </a:p>
+          <a:p>
+            <a:endParaRPr lang="en-US" baseline="0" dirty="0" smtClean="0"/>
+          </a:p>
+          <a:p>
+            <a:r>
+              <a:rPr lang="en-US" baseline="0" dirty="0" smtClean="0"/>
+              <a:t>For most scenarios, this is all you need.</a:t>
+            </a:r>
+            <a:endParaRPr lang="en-US" dirty="0"/>
+          </a:p>
+        </p:txBody>
+      </p:sp>
+      <p:sp>
+        <p:nvSpPr>
+          <p:cNvPr id="4" name="Slide Number Placeholder 3"/>
+          <p:cNvSpPr>
+            <a:spLocks noGrp="1"/>
+          </p:cNvSpPr>
+          <p:nvPr>
+            <p:ph type="sldNum" sz="quarter" idx="10"/>
+          </p:nvPr>
+        </p:nvSpPr>
+        <p:spPr/>
+        <p:txBody>
+          <a:bodyPr/>
+          <a:lstStyle/>
+          <a:p>
+            <a:fld id="{ABEEAED5-6BB0-3543-A175-5FEF91939696}" type="slidenum">
+              <a:rPr lang="en-US" smtClean="0"/>
+              <a:t>19</a:t>
+            </a:fld>
+            <a:endParaRPr lang="en-US"/>
+          </a:p>
+        </p:txBody>
+      </p:sp>
+    </p:spTree>
+    <p:extLst>
+      <p:ext uri="{BB962C8B-B14F-4D97-AF65-F5344CB8AC3E}">
+        <p14:creationId xmlns:p14="http://schemas.microsoft.com/office/powerpoint/2010/main" val="3835270360"/>
+      </p:ext>
+    </p:extLst>
+  </p:cSld>
+  <p:clrMapOvr>
+    <a:masterClrMapping/>
+  </p:clrMapOvr>
+</p:notes>
+</file>
+
+<file path=ppt/notesSlides/notesSlide18.xml><?xml version="1.0" encoding="utf-8"?>
+<p:notes xmlns:a="http://schemas.openxmlformats.org/drawingml/2006/main" xmlns:r="http://schemas.openxmlformats.org/officeDocument/2006/relationships" xmlns:p="http://schemas.openxmlformats.org/presentationml/2006/main">
+  <p:cSld>
+    <p:spTree>
+      <p:nvGrpSpPr>
+        <p:cNvPr id="1" name=""/>
+        <p:cNvGrpSpPr/>
+        <p:nvPr/>
+      </p:nvGrpSpPr>
+      <p:grpSpPr>
+        <a:xfrm>
+          <a:off x="0" y="0"/>
+          <a:ext cx="0" cy="0"/>
+          <a:chOff x="0" y="0"/>
+          <a:chExt cx="0" cy="0"/>
+        </a:xfrm>
+      </p:grpSpPr>
+      <p:sp>
+        <p:nvSpPr>
+          <p:cNvPr id="2" name="Slide Image Placeholder 1"/>
+          <p:cNvSpPr>
+            <a:spLocks noGrp="1" noRot="1" noChangeAspect="1"/>
+          </p:cNvSpPr>
+          <p:nvPr>
+            <p:ph type="sldImg"/>
+          </p:nvPr>
+        </p:nvSpPr>
+        <p:spPr/>
+      </p:sp>
+      <p:sp>
+        <p:nvSpPr>
+          <p:cNvPr id="3" name="Notes Placeholder 2"/>
+          <p:cNvSpPr>
+            <a:spLocks noGrp="1"/>
+          </p:cNvSpPr>
+          <p:nvPr>
+            <p:ph type="body" idx="1"/>
+          </p:nvPr>
+        </p:nvSpPr>
+        <p:spPr/>
+        <p:txBody>
+          <a:bodyPr/>
+          <a:lstStyle/>
+          <a:p>
+            <a:r>
+              <a:rPr lang="en-US" dirty="0" smtClean="0"/>
+              <a:t>So</a:t>
+            </a:r>
+            <a:r>
+              <a:rPr lang="en-US" baseline="0" dirty="0" smtClean="0"/>
+              <a:t> let’s talk about stuff beyond the basics.</a:t>
+            </a:r>
+          </a:p>
+          <a:p>
+            <a:endParaRPr lang="en-US" baseline="0" dirty="0" smtClean="0"/>
+          </a:p>
+          <a:p>
+            <a:r>
+              <a:rPr lang="en-US" baseline="0" dirty="0" smtClean="0"/>
+              <a:t>What if you need to encrypt your data records? Say you’re storing somebody’s financial history?</a:t>
+            </a:r>
+          </a:p>
+          <a:p>
+            <a:endParaRPr lang="en-US" baseline="0" dirty="0" smtClean="0"/>
+          </a:p>
+          <a:p>
+            <a:r>
+              <a:rPr lang="en-US" baseline="0" dirty="0" smtClean="0"/>
+              <a:t>What about exchanging information with third parties? Perhaps you need to batch process a bunch of bank transactions every night? Or receive a list of the latest 0-day exploits. In either case, you want to transfer this stuff securely.</a:t>
+            </a:r>
+            <a:endParaRPr lang="en-US" dirty="0"/>
+          </a:p>
+        </p:txBody>
+      </p:sp>
+      <p:sp>
+        <p:nvSpPr>
+          <p:cNvPr id="4" name="Slide Number Placeholder 3"/>
+          <p:cNvSpPr>
+            <a:spLocks noGrp="1"/>
+          </p:cNvSpPr>
+          <p:nvPr>
+            <p:ph type="sldNum" sz="quarter" idx="10"/>
+          </p:nvPr>
+        </p:nvSpPr>
+        <p:spPr/>
+        <p:txBody>
+          <a:bodyPr/>
+          <a:lstStyle/>
+          <a:p>
+            <a:fld id="{ABEEAED5-6BB0-3543-A175-5FEF91939696}" type="slidenum">
+              <a:rPr lang="en-US" smtClean="0"/>
+              <a:t>20</a:t>
+            </a:fld>
+            <a:endParaRPr lang="en-US"/>
+          </a:p>
+        </p:txBody>
+      </p:sp>
+    </p:spTree>
+    <p:extLst>
+      <p:ext uri="{BB962C8B-B14F-4D97-AF65-F5344CB8AC3E}">
+        <p14:creationId xmlns:p14="http://schemas.microsoft.com/office/powerpoint/2010/main" val="4173391711"/>
+      </p:ext>
+    </p:extLst>
+  </p:cSld>
+  <p:clrMapOvr>
+    <a:masterClrMapping/>
+  </p:clrMapOvr>
+</p:notes>
+</file>
+
+<file path=ppt/notesSlides/notesSlide19.xml><?xml version="1.0" encoding="utf-8"?>
+<p:notes xmlns:a="http://schemas.openxmlformats.org/drawingml/2006/main" xmlns:r="http://schemas.openxmlformats.org/officeDocument/2006/relationships" xmlns:p="http://schemas.openxmlformats.org/presentationml/2006/main">
+  <p:cSld>
+    <p:spTree>
+      <p:nvGrpSpPr>
+        <p:cNvPr id="1" name=""/>
+        <p:cNvGrpSpPr/>
+        <p:nvPr/>
+      </p:nvGrpSpPr>
+      <p:grpSpPr>
+        <a:xfrm>
+          <a:off x="0" y="0"/>
+          <a:ext cx="0" cy="0"/>
+          <a:chOff x="0" y="0"/>
+          <a:chExt cx="0" cy="0"/>
+        </a:xfrm>
+      </p:grpSpPr>
+      <p:sp>
+        <p:nvSpPr>
+          <p:cNvPr id="2" name="Slide Image Placeholder 1"/>
+          <p:cNvSpPr>
+            <a:spLocks noGrp="1" noRot="1" noChangeAspect="1"/>
+          </p:cNvSpPr>
+          <p:nvPr>
+            <p:ph type="sldImg"/>
+          </p:nvPr>
+        </p:nvSpPr>
+        <p:spPr/>
+      </p:sp>
+      <p:sp>
+        <p:nvSpPr>
+          <p:cNvPr id="3" name="Notes Placeholder 2"/>
+          <p:cNvSpPr>
+            <a:spLocks noGrp="1"/>
+          </p:cNvSpPr>
+          <p:nvPr>
+            <p:ph type="body" idx="1"/>
+          </p:nvPr>
+        </p:nvSpPr>
+        <p:spPr/>
+        <p:txBody>
+          <a:bodyPr/>
+          <a:lstStyle/>
+          <a:p>
+            <a:r>
+              <a:rPr lang="en-US" dirty="0" smtClean="0"/>
+              <a:t>So, I don’t really want to belabor this point, but this is </a:t>
+            </a:r>
+            <a:r>
+              <a:rPr lang="en-US" dirty="0" err="1" smtClean="0"/>
+              <a:t>kinda</a:t>
+            </a:r>
+            <a:r>
+              <a:rPr lang="en-US" baseline="0" dirty="0" smtClean="0"/>
+              <a:t> the table stakes use case, so lets talk about it for a minute. You really shouldn’t need to manage your own passwords, but if you do, don’t do it like this. See the problem? We can just call this the “linked-in method”.</a:t>
+            </a:r>
+            <a:endParaRPr lang="en-US" dirty="0"/>
+          </a:p>
+        </p:txBody>
+      </p:sp>
+      <p:sp>
+        <p:nvSpPr>
+          <p:cNvPr id="4" name="Slide Number Placeholder 3"/>
+          <p:cNvSpPr>
+            <a:spLocks noGrp="1"/>
+          </p:cNvSpPr>
+          <p:nvPr>
+            <p:ph type="sldNum" sz="quarter" idx="10"/>
+          </p:nvPr>
+        </p:nvSpPr>
+        <p:spPr/>
+        <p:txBody>
+          <a:bodyPr/>
+          <a:lstStyle/>
+          <a:p>
+            <a:fld id="{ABEEAED5-6BB0-3543-A175-5FEF91939696}" type="slidenum">
+              <a:rPr lang="en-US" smtClean="0"/>
+              <a:t>21</a:t>
+            </a:fld>
+            <a:endParaRPr lang="en-US"/>
+          </a:p>
+        </p:txBody>
+      </p:sp>
+    </p:spTree>
+    <p:extLst>
+      <p:ext uri="{BB962C8B-B14F-4D97-AF65-F5344CB8AC3E}">
+        <p14:creationId xmlns:p14="http://schemas.microsoft.com/office/powerpoint/2010/main" val="1740366862"/>
       </p:ext>
     </p:extLst>
   </p:cSld>
@@ -8228,7 +9408,32 @@
             </a:r>
             <a:r>
               <a:rPr lang="en-US" baseline="0" dirty="0" smtClean="0"/>
-              <a:t> not a cryptographer. Even if I was, honestly, you shouldn’t take what I say at face value. There’s simply no substitute for understanding what you’re doing, which is why I’m going to try and help you understand and make your own decisions. I’ve been working with cryptography in various capacities for a good long while. Most recently, I’ve had the opportunity to build out a soup-to-nuts information security management system, which has given me the chance to look at our existing and proposed use of cryptography with a more critical eye. We’ve had to learn a few thing by trial and error. Today, I’m going to try and help you avoid doing that.</a:t>
+              <a:t> not a cryptographer. Even if I was, honestly, you shouldn’t take what I say at face value. There’s simply no substitute for understanding what you’re doing, which is why I’m going to try and help you understand and make your own decisions</a:t>
+            </a:r>
+            <a:r>
+              <a:rPr lang="en-US" baseline="0" dirty="0" smtClean="0"/>
+              <a:t>.</a:t>
+            </a:r>
+          </a:p>
+          <a:p>
+            <a:endParaRPr lang="en-US" baseline="0" dirty="0" smtClean="0"/>
+          </a:p>
+          <a:p>
+            <a:r>
+              <a:rPr lang="en-US" baseline="0" dirty="0" smtClean="0"/>
+              <a:t>Regardless, </a:t>
+            </a:r>
+            <a:r>
+              <a:rPr lang="en-US" baseline="0" dirty="0" smtClean="0"/>
+              <a:t>I’ve been working with cryptography in various capacities for a </a:t>
+            </a:r>
+            <a:r>
+              <a:rPr lang="en-US" baseline="0" dirty="0" smtClean="0"/>
+              <a:t>while</a:t>
+            </a:r>
+            <a:r>
+              <a:rPr lang="en-US" baseline="0" dirty="0" smtClean="0"/>
+              <a:t>. Most recently, I’ve had the opportunity to build out a soup-to-nuts information security management system, which has given me the chance to look at our existing and proposed use of cryptography with a more critical eye. We’ve had to learn a few thing by trial and error. Today, I’m going to try and help you avoid doing that.</a:t>
             </a:r>
             <a:endParaRPr lang="en-US" dirty="0"/>
           </a:p>
@@ -8261,6 +9466,858 @@
     <p:extLst>
       <p:ext uri="{BB962C8B-B14F-4D97-AF65-F5344CB8AC3E}">
         <p14:creationId xmlns:p14="http://schemas.microsoft.com/office/powerpoint/2010/main" val="607675467"/>
+      </p:ext>
+    </p:extLst>
+  </p:cSld>
+  <p:clrMapOvr>
+    <a:masterClrMapping/>
+  </p:clrMapOvr>
+</p:notes>
+</file>
+
+<file path=ppt/notesSlides/notesSlide20.xml><?xml version="1.0" encoding="utf-8"?>
+<p:notes xmlns:a="http://schemas.openxmlformats.org/drawingml/2006/main" xmlns:r="http://schemas.openxmlformats.org/officeDocument/2006/relationships" xmlns:p="http://schemas.openxmlformats.org/presentationml/2006/main">
+  <p:cSld>
+    <p:spTree>
+      <p:nvGrpSpPr>
+        <p:cNvPr id="1" name=""/>
+        <p:cNvGrpSpPr/>
+        <p:nvPr/>
+      </p:nvGrpSpPr>
+      <p:grpSpPr>
+        <a:xfrm>
+          <a:off x="0" y="0"/>
+          <a:ext cx="0" cy="0"/>
+          <a:chOff x="0" y="0"/>
+          <a:chExt cx="0" cy="0"/>
+        </a:xfrm>
+      </p:grpSpPr>
+      <p:sp>
+        <p:nvSpPr>
+          <p:cNvPr id="2" name="Slide Image Placeholder 1"/>
+          <p:cNvSpPr>
+            <a:spLocks noGrp="1" noRot="1" noChangeAspect="1"/>
+          </p:cNvSpPr>
+          <p:nvPr>
+            <p:ph type="sldImg"/>
+          </p:nvPr>
+        </p:nvSpPr>
+        <p:spPr/>
+      </p:sp>
+      <p:sp>
+        <p:nvSpPr>
+          <p:cNvPr id="3" name="Notes Placeholder 2"/>
+          <p:cNvSpPr>
+            <a:spLocks noGrp="1"/>
+          </p:cNvSpPr>
+          <p:nvPr>
+            <p:ph type="body" idx="1"/>
+          </p:nvPr>
+        </p:nvSpPr>
+        <p:spPr/>
+        <p:txBody>
+          <a:bodyPr/>
+          <a:lstStyle/>
+          <a:p>
+            <a:r>
+              <a:rPr lang="en-US" dirty="0" smtClean="0"/>
+              <a:t>Here’s how it’s done right. You might recognize</a:t>
+            </a:r>
+            <a:r>
+              <a:rPr lang="en-US" baseline="0" dirty="0" smtClean="0"/>
+              <a:t> this code from somewhere… hmm.</a:t>
+            </a:r>
+          </a:p>
+          <a:p>
+            <a:endParaRPr lang="en-US" baseline="0" dirty="0" smtClean="0"/>
+          </a:p>
+          <a:p>
+            <a:r>
+              <a:rPr lang="en-US" baseline="0" dirty="0" smtClean="0"/>
+              <a:t>I want to draw your attention to two key details. The first is </a:t>
+            </a:r>
+            <a:r>
+              <a:rPr lang="en-US" baseline="0" dirty="0" err="1" smtClean="0"/>
+              <a:t>get_random_string</a:t>
+            </a:r>
+            <a:r>
+              <a:rPr lang="en-US" baseline="0" dirty="0" smtClean="0"/>
+              <a:t>(). That’s a great function, and appears to be introduced in </a:t>
+            </a:r>
+            <a:r>
+              <a:rPr lang="en-US" baseline="0" dirty="0" err="1" smtClean="0"/>
+              <a:t>django</a:t>
+            </a:r>
+            <a:r>
+              <a:rPr lang="en-US" baseline="0" dirty="0" smtClean="0"/>
+              <a:t> 1.4. It uses </a:t>
+            </a:r>
+            <a:r>
+              <a:rPr lang="en-US" baseline="0" dirty="0" err="1" smtClean="0"/>
+              <a:t>random.SystemRandom</a:t>
+            </a:r>
+            <a:r>
+              <a:rPr lang="en-US" baseline="0" dirty="0" smtClean="0"/>
+              <a:t> if possible, and then falls back to the default </a:t>
+            </a:r>
+            <a:r>
+              <a:rPr lang="en-US" baseline="0" dirty="0" err="1" smtClean="0"/>
+              <a:t>mersenne</a:t>
+            </a:r>
+            <a:r>
+              <a:rPr lang="en-US" baseline="0" dirty="0" smtClean="0"/>
+              <a:t> twister algorithm if it can’t find it. For crypto, entropy is good, and it needs hardware support to do well. This is an easy way to get it with </a:t>
+            </a:r>
+            <a:r>
+              <a:rPr lang="en-US" baseline="0" dirty="0" err="1" smtClean="0"/>
+              <a:t>django</a:t>
+            </a:r>
+            <a:r>
+              <a:rPr lang="en-US" baseline="0" dirty="0" smtClean="0"/>
+              <a:t>.</a:t>
+            </a:r>
+          </a:p>
+          <a:p>
+            <a:endParaRPr lang="en-US" baseline="0" dirty="0" smtClean="0"/>
+          </a:p>
+          <a:p>
+            <a:r>
+              <a:rPr lang="en-US" baseline="0" dirty="0" smtClean="0"/>
+              <a:t>The second thing is that hashing algorithm. That’s a “key derivation function” called pbkdf2. There are other options such as </a:t>
+            </a:r>
+            <a:r>
+              <a:rPr lang="en-US" baseline="0" dirty="0" err="1" smtClean="0"/>
+              <a:t>bcrypt</a:t>
+            </a:r>
+            <a:r>
+              <a:rPr lang="en-US" baseline="0" dirty="0" smtClean="0"/>
+              <a:t>, </a:t>
+            </a:r>
+            <a:r>
+              <a:rPr lang="en-US" baseline="0" dirty="0" err="1" smtClean="0"/>
+              <a:t>scrypt</a:t>
+            </a:r>
+            <a:r>
+              <a:rPr lang="en-US" baseline="0" dirty="0" smtClean="0"/>
+              <a:t>, and friends. The key </a:t>
+            </a:r>
+            <a:r>
+              <a:rPr lang="en-US" baseline="0" dirty="0" err="1" smtClean="0"/>
+              <a:t>takaway</a:t>
+            </a:r>
+            <a:r>
+              <a:rPr lang="en-US" baseline="0" dirty="0" smtClean="0"/>
+              <a:t> here is that it’s computationally expensive. Coupled with a per-record has, that makes brute forcing these passwords computationally infeasible. That’s what we want!</a:t>
+            </a:r>
+          </a:p>
+          <a:p>
+            <a:endParaRPr lang="en-US" baseline="0" dirty="0" smtClean="0"/>
+          </a:p>
+          <a:p>
+            <a:endParaRPr lang="en-US" dirty="0"/>
+          </a:p>
+        </p:txBody>
+      </p:sp>
+      <p:sp>
+        <p:nvSpPr>
+          <p:cNvPr id="4" name="Slide Number Placeholder 3"/>
+          <p:cNvSpPr>
+            <a:spLocks noGrp="1"/>
+          </p:cNvSpPr>
+          <p:nvPr>
+            <p:ph type="sldNum" sz="quarter" idx="10"/>
+          </p:nvPr>
+        </p:nvSpPr>
+        <p:spPr/>
+        <p:txBody>
+          <a:bodyPr/>
+          <a:lstStyle/>
+          <a:p>
+            <a:fld id="{ABEEAED5-6BB0-3543-A175-5FEF91939696}" type="slidenum">
+              <a:rPr lang="en-US" smtClean="0"/>
+              <a:t>22</a:t>
+            </a:fld>
+            <a:endParaRPr lang="en-US"/>
+          </a:p>
+        </p:txBody>
+      </p:sp>
+    </p:spTree>
+    <p:extLst>
+      <p:ext uri="{BB962C8B-B14F-4D97-AF65-F5344CB8AC3E}">
+        <p14:creationId xmlns:p14="http://schemas.microsoft.com/office/powerpoint/2010/main" val="2209011230"/>
+      </p:ext>
+    </p:extLst>
+  </p:cSld>
+  <p:clrMapOvr>
+    <a:masterClrMapping/>
+  </p:clrMapOvr>
+</p:notes>
+</file>
+
+<file path=ppt/notesSlides/notesSlide21.xml><?xml version="1.0" encoding="utf-8"?>
+<p:notes xmlns:a="http://schemas.openxmlformats.org/drawingml/2006/main" xmlns:r="http://schemas.openxmlformats.org/officeDocument/2006/relationships" xmlns:p="http://schemas.openxmlformats.org/presentationml/2006/main">
+  <p:cSld>
+    <p:spTree>
+      <p:nvGrpSpPr>
+        <p:cNvPr id="1" name=""/>
+        <p:cNvGrpSpPr/>
+        <p:nvPr/>
+      </p:nvGrpSpPr>
+      <p:grpSpPr>
+        <a:xfrm>
+          <a:off x="0" y="0"/>
+          <a:ext cx="0" cy="0"/>
+          <a:chOff x="0" y="0"/>
+          <a:chExt cx="0" cy="0"/>
+        </a:xfrm>
+      </p:grpSpPr>
+      <p:sp>
+        <p:nvSpPr>
+          <p:cNvPr id="2" name="Slide Image Placeholder 1"/>
+          <p:cNvSpPr>
+            <a:spLocks noGrp="1" noRot="1" noChangeAspect="1"/>
+          </p:cNvSpPr>
+          <p:nvPr>
+            <p:ph type="sldImg"/>
+          </p:nvPr>
+        </p:nvSpPr>
+        <p:spPr/>
+      </p:sp>
+      <p:sp>
+        <p:nvSpPr>
+          <p:cNvPr id="3" name="Notes Placeholder 2"/>
+          <p:cNvSpPr>
+            <a:spLocks noGrp="1"/>
+          </p:cNvSpPr>
+          <p:nvPr>
+            <p:ph type="body" idx="1"/>
+          </p:nvPr>
+        </p:nvSpPr>
+        <p:spPr/>
+        <p:txBody>
+          <a:bodyPr/>
+          <a:lstStyle/>
+          <a:p>
+            <a:r>
+              <a:rPr lang="en-US" dirty="0" smtClean="0"/>
+              <a:t>So let’s look a</a:t>
+            </a:r>
+            <a:r>
+              <a:rPr lang="en-US" baseline="0" dirty="0" smtClean="0"/>
+              <a:t>t a real use case. We receive lists of “known” people and need to allow people to authenticate against the list. Unfortunately, sometimes the only data we have to identify people with are pieces of information we don’t want to have – PII/PHI. Hashing that information with a salt adds a measure of security, but still allows us to do the lookups.</a:t>
+            </a:r>
+          </a:p>
+          <a:p>
+            <a:endParaRPr lang="en-US" baseline="0" dirty="0" smtClean="0"/>
+          </a:p>
+          <a:p>
+            <a:r>
+              <a:rPr lang="en-US" baseline="0" dirty="0" smtClean="0"/>
+              <a:t>The technical term for this is HMAC, which specifies a specific method for combining the salt and the record itself. The code you see here is a bit more naïve, but the point still stands. </a:t>
+            </a:r>
+            <a:endParaRPr lang="en-US" dirty="0"/>
+          </a:p>
+        </p:txBody>
+      </p:sp>
+      <p:sp>
+        <p:nvSpPr>
+          <p:cNvPr id="4" name="Slide Number Placeholder 3"/>
+          <p:cNvSpPr>
+            <a:spLocks noGrp="1"/>
+          </p:cNvSpPr>
+          <p:nvPr>
+            <p:ph type="sldNum" sz="quarter" idx="10"/>
+          </p:nvPr>
+        </p:nvSpPr>
+        <p:spPr/>
+        <p:txBody>
+          <a:bodyPr/>
+          <a:lstStyle/>
+          <a:p>
+            <a:fld id="{ABEEAED5-6BB0-3543-A175-5FEF91939696}" type="slidenum">
+              <a:rPr lang="en-US" smtClean="0"/>
+              <a:t>24</a:t>
+            </a:fld>
+            <a:endParaRPr lang="en-US"/>
+          </a:p>
+        </p:txBody>
+      </p:sp>
+    </p:spTree>
+    <p:extLst>
+      <p:ext uri="{BB962C8B-B14F-4D97-AF65-F5344CB8AC3E}">
+        <p14:creationId xmlns:p14="http://schemas.microsoft.com/office/powerpoint/2010/main" val="2575059278"/>
+      </p:ext>
+    </p:extLst>
+  </p:cSld>
+  <p:clrMapOvr>
+    <a:masterClrMapping/>
+  </p:clrMapOvr>
+</p:notes>
+</file>
+
+<file path=ppt/notesSlides/notesSlide22.xml><?xml version="1.0" encoding="utf-8"?>
+<p:notes xmlns:a="http://schemas.openxmlformats.org/drawingml/2006/main" xmlns:r="http://schemas.openxmlformats.org/officeDocument/2006/relationships" xmlns:p="http://schemas.openxmlformats.org/presentationml/2006/main">
+  <p:cSld>
+    <p:spTree>
+      <p:nvGrpSpPr>
+        <p:cNvPr id="1" name=""/>
+        <p:cNvGrpSpPr/>
+        <p:nvPr/>
+      </p:nvGrpSpPr>
+      <p:grpSpPr>
+        <a:xfrm>
+          <a:off x="0" y="0"/>
+          <a:ext cx="0" cy="0"/>
+          <a:chOff x="0" y="0"/>
+          <a:chExt cx="0" cy="0"/>
+        </a:xfrm>
+      </p:grpSpPr>
+      <p:sp>
+        <p:nvSpPr>
+          <p:cNvPr id="2" name="Slide Image Placeholder 1"/>
+          <p:cNvSpPr>
+            <a:spLocks noGrp="1" noRot="1" noChangeAspect="1"/>
+          </p:cNvSpPr>
+          <p:nvPr>
+            <p:ph type="sldImg"/>
+          </p:nvPr>
+        </p:nvSpPr>
+        <p:spPr/>
+      </p:sp>
+      <p:sp>
+        <p:nvSpPr>
+          <p:cNvPr id="3" name="Notes Placeholder 2"/>
+          <p:cNvSpPr>
+            <a:spLocks noGrp="1"/>
+          </p:cNvSpPr>
+          <p:nvPr>
+            <p:ph type="body" idx="1"/>
+          </p:nvPr>
+        </p:nvSpPr>
+        <p:spPr/>
+        <p:txBody>
+          <a:bodyPr/>
+          <a:lstStyle/>
+          <a:p>
+            <a:r>
+              <a:rPr lang="en-US" dirty="0" smtClean="0"/>
+              <a:t>Another use case is storing information</a:t>
+            </a:r>
+            <a:r>
+              <a:rPr lang="en-US" baseline="0" dirty="0" smtClean="0"/>
+              <a:t> on a user record or some such. In an ideal scenario, you’d get the key from the user and store it in memory. Here I’m just stuffing it into the code. Key management is definitely the hard problem here, but what I want to point out first is the presence of the initialization vector.</a:t>
+            </a:r>
+          </a:p>
+          <a:p>
+            <a:endParaRPr lang="en-US" baseline="0" dirty="0" smtClean="0"/>
+          </a:p>
+          <a:p>
+            <a:r>
+              <a:rPr lang="en-US" baseline="0" dirty="0" smtClean="0"/>
+              <a:t>This is a pit I’ve seen a few of our customers fall into. “Oh that’s just the IV, it’s like another key”. Wrong! If you don’t have a random IV, you’ve basically downgraded your cipher to an electronic codebook, which can be cracked via known plaintext pretty easily. Check out the </a:t>
+            </a:r>
+            <a:r>
+              <a:rPr lang="en-US" baseline="0" dirty="0" err="1" smtClean="0"/>
+              <a:t>wikipedia</a:t>
+            </a:r>
+            <a:r>
+              <a:rPr lang="en-US" baseline="0" dirty="0" smtClean="0"/>
+              <a:t> article on </a:t>
+            </a:r>
+            <a:r>
+              <a:rPr lang="en-US" baseline="0" dirty="0" err="1" smtClean="0"/>
+              <a:t>initiatialization</a:t>
+            </a:r>
+            <a:r>
+              <a:rPr lang="en-US" baseline="0" dirty="0" smtClean="0"/>
+              <a:t> vectors.</a:t>
+            </a:r>
+          </a:p>
+          <a:p>
+            <a:endParaRPr lang="en-US" baseline="0" dirty="0" smtClean="0"/>
+          </a:p>
+          <a:p>
+            <a:r>
+              <a:rPr lang="en-US" baseline="0" dirty="0" smtClean="0"/>
+              <a:t>This code actually runs, and uses m2crypto to run </a:t>
+            </a:r>
+            <a:r>
+              <a:rPr lang="en-US" baseline="0" dirty="0" err="1" smtClean="0"/>
+              <a:t>openssl</a:t>
+            </a:r>
+            <a:r>
+              <a:rPr lang="en-US" baseline="0" dirty="0" smtClean="0"/>
+              <a:t>. Take it for what it is.</a:t>
+            </a:r>
+            <a:endParaRPr lang="en-US" dirty="0" smtClean="0"/>
+          </a:p>
+        </p:txBody>
+      </p:sp>
+      <p:sp>
+        <p:nvSpPr>
+          <p:cNvPr id="4" name="Slide Number Placeholder 3"/>
+          <p:cNvSpPr>
+            <a:spLocks noGrp="1"/>
+          </p:cNvSpPr>
+          <p:nvPr>
+            <p:ph type="sldNum" sz="quarter" idx="10"/>
+          </p:nvPr>
+        </p:nvSpPr>
+        <p:spPr/>
+        <p:txBody>
+          <a:bodyPr/>
+          <a:lstStyle/>
+          <a:p>
+            <a:fld id="{ABEEAED5-6BB0-3543-A175-5FEF91939696}" type="slidenum">
+              <a:rPr lang="en-US" smtClean="0"/>
+              <a:t>25</a:t>
+            </a:fld>
+            <a:endParaRPr lang="en-US"/>
+          </a:p>
+        </p:txBody>
+      </p:sp>
+    </p:spTree>
+    <p:extLst>
+      <p:ext uri="{BB962C8B-B14F-4D97-AF65-F5344CB8AC3E}">
+        <p14:creationId xmlns:p14="http://schemas.microsoft.com/office/powerpoint/2010/main" val="4088174744"/>
+      </p:ext>
+    </p:extLst>
+  </p:cSld>
+  <p:clrMapOvr>
+    <a:masterClrMapping/>
+  </p:clrMapOvr>
+</p:notes>
+</file>
+
+<file path=ppt/notesSlides/notesSlide23.xml><?xml version="1.0" encoding="utf-8"?>
+<p:notes xmlns:a="http://schemas.openxmlformats.org/drawingml/2006/main" xmlns:r="http://schemas.openxmlformats.org/officeDocument/2006/relationships" xmlns:p="http://schemas.openxmlformats.org/presentationml/2006/main">
+  <p:cSld>
+    <p:spTree>
+      <p:nvGrpSpPr>
+        <p:cNvPr id="1" name=""/>
+        <p:cNvGrpSpPr/>
+        <p:nvPr/>
+      </p:nvGrpSpPr>
+      <p:grpSpPr>
+        <a:xfrm>
+          <a:off x="0" y="0"/>
+          <a:ext cx="0" cy="0"/>
+          <a:chOff x="0" y="0"/>
+          <a:chExt cx="0" cy="0"/>
+        </a:xfrm>
+      </p:grpSpPr>
+      <p:sp>
+        <p:nvSpPr>
+          <p:cNvPr id="2" name="Slide Image Placeholder 1"/>
+          <p:cNvSpPr>
+            <a:spLocks noGrp="1" noRot="1" noChangeAspect="1"/>
+          </p:cNvSpPr>
+          <p:nvPr>
+            <p:ph type="sldImg"/>
+          </p:nvPr>
+        </p:nvSpPr>
+        <p:spPr/>
+      </p:sp>
+      <p:sp>
+        <p:nvSpPr>
+          <p:cNvPr id="3" name="Notes Placeholder 2"/>
+          <p:cNvSpPr>
+            <a:spLocks noGrp="1"/>
+          </p:cNvSpPr>
+          <p:nvPr>
+            <p:ph type="body" idx="1"/>
+          </p:nvPr>
+        </p:nvSpPr>
+        <p:spPr/>
+        <p:txBody>
+          <a:bodyPr/>
+          <a:lstStyle/>
+          <a:p>
+            <a:r>
+              <a:rPr lang="en-US" dirty="0" smtClean="0"/>
+              <a:t>So, here’s a </a:t>
+            </a:r>
+            <a:r>
+              <a:rPr lang="en-US" dirty="0" err="1" smtClean="0"/>
+              <a:t>django</a:t>
+            </a:r>
+            <a:r>
+              <a:rPr lang="en-US" dirty="0" smtClean="0"/>
+              <a:t> use case for that symmetric</a:t>
+            </a:r>
+            <a:r>
+              <a:rPr lang="en-US" baseline="0" dirty="0" smtClean="0"/>
+              <a:t> encryption code. This is semi-pseudo code, you need a ton of exception handling and error checking for this to be legit, so don’t just copy it.</a:t>
+            </a:r>
+          </a:p>
+          <a:p>
+            <a:endParaRPr lang="en-US" baseline="0" dirty="0" smtClean="0"/>
+          </a:p>
+          <a:p>
+            <a:r>
+              <a:rPr lang="en-US" baseline="0" dirty="0" smtClean="0"/>
+              <a:t>But the premise stands. This is a simple view, it receives and IV and a </a:t>
+            </a:r>
+            <a:r>
+              <a:rPr lang="en-US" baseline="0" dirty="0" err="1" smtClean="0"/>
+              <a:t>ciphertext</a:t>
+            </a:r>
+            <a:r>
+              <a:rPr lang="en-US" baseline="0" dirty="0" smtClean="0"/>
+              <a:t>. It decrypts it, and uses the encrypted </a:t>
+            </a:r>
+            <a:r>
+              <a:rPr lang="en-US" baseline="0" dirty="0" err="1" smtClean="0"/>
+              <a:t>json</a:t>
+            </a:r>
+            <a:r>
+              <a:rPr lang="en-US" baseline="0" dirty="0" smtClean="0"/>
+              <a:t> record to create a new user record and sign them in. This is cool because it’s safe to accept via a get request since you can trust the sender, and it’s super easy to implement from any programming language.</a:t>
+            </a:r>
+          </a:p>
+          <a:p>
+            <a:endParaRPr lang="en-US" baseline="0" dirty="0" smtClean="0"/>
+          </a:p>
+          <a:p>
+            <a:r>
+              <a:rPr lang="en-US" baseline="0" dirty="0" smtClean="0"/>
+              <a:t>SAML does the same stuff. It also doesn’t fit on one slide.</a:t>
+            </a:r>
+            <a:endParaRPr lang="en-US" dirty="0"/>
+          </a:p>
+        </p:txBody>
+      </p:sp>
+      <p:sp>
+        <p:nvSpPr>
+          <p:cNvPr id="4" name="Slide Number Placeholder 3"/>
+          <p:cNvSpPr>
+            <a:spLocks noGrp="1"/>
+          </p:cNvSpPr>
+          <p:nvPr>
+            <p:ph type="sldNum" sz="quarter" idx="10"/>
+          </p:nvPr>
+        </p:nvSpPr>
+        <p:spPr/>
+        <p:txBody>
+          <a:bodyPr/>
+          <a:lstStyle/>
+          <a:p>
+            <a:fld id="{ABEEAED5-6BB0-3543-A175-5FEF91939696}" type="slidenum">
+              <a:rPr lang="en-US" smtClean="0"/>
+              <a:t>26</a:t>
+            </a:fld>
+            <a:endParaRPr lang="en-US"/>
+          </a:p>
+        </p:txBody>
+      </p:sp>
+    </p:spTree>
+    <p:extLst>
+      <p:ext uri="{BB962C8B-B14F-4D97-AF65-F5344CB8AC3E}">
+        <p14:creationId xmlns:p14="http://schemas.microsoft.com/office/powerpoint/2010/main" val="2078928111"/>
+      </p:ext>
+    </p:extLst>
+  </p:cSld>
+  <p:clrMapOvr>
+    <a:masterClrMapping/>
+  </p:clrMapOvr>
+</p:notes>
+</file>
+
+<file path=ppt/notesSlides/notesSlide24.xml><?xml version="1.0" encoding="utf-8"?>
+<p:notes xmlns:a="http://schemas.openxmlformats.org/drawingml/2006/main" xmlns:r="http://schemas.openxmlformats.org/officeDocument/2006/relationships" xmlns:p="http://schemas.openxmlformats.org/presentationml/2006/main">
+  <p:cSld>
+    <p:spTree>
+      <p:nvGrpSpPr>
+        <p:cNvPr id="1" name=""/>
+        <p:cNvGrpSpPr/>
+        <p:nvPr/>
+      </p:nvGrpSpPr>
+      <p:grpSpPr>
+        <a:xfrm>
+          <a:off x="0" y="0"/>
+          <a:ext cx="0" cy="0"/>
+          <a:chOff x="0" y="0"/>
+          <a:chExt cx="0" cy="0"/>
+        </a:xfrm>
+      </p:grpSpPr>
+      <p:sp>
+        <p:nvSpPr>
+          <p:cNvPr id="2" name="Slide Image Placeholder 1"/>
+          <p:cNvSpPr>
+            <a:spLocks noGrp="1" noRot="1" noChangeAspect="1"/>
+          </p:cNvSpPr>
+          <p:nvPr>
+            <p:ph type="sldImg"/>
+          </p:nvPr>
+        </p:nvSpPr>
+        <p:spPr/>
+      </p:sp>
+      <p:sp>
+        <p:nvSpPr>
+          <p:cNvPr id="3" name="Notes Placeholder 2"/>
+          <p:cNvSpPr>
+            <a:spLocks noGrp="1"/>
+          </p:cNvSpPr>
+          <p:nvPr>
+            <p:ph type="body" idx="1"/>
+          </p:nvPr>
+        </p:nvSpPr>
+        <p:spPr/>
+        <p:txBody>
+          <a:bodyPr/>
+          <a:lstStyle/>
+          <a:p>
+            <a:r>
+              <a:rPr lang="en-US" dirty="0" smtClean="0"/>
+              <a:t>Finally, I</a:t>
+            </a:r>
+            <a:r>
+              <a:rPr lang="en-US" baseline="0" dirty="0" smtClean="0"/>
+              <a:t> want to talk about key management. Even after this talk.</a:t>
+            </a:r>
+            <a:endParaRPr lang="en-US" dirty="0"/>
+          </a:p>
+        </p:txBody>
+      </p:sp>
+      <p:sp>
+        <p:nvSpPr>
+          <p:cNvPr id="4" name="Slide Number Placeholder 3"/>
+          <p:cNvSpPr>
+            <a:spLocks noGrp="1"/>
+          </p:cNvSpPr>
+          <p:nvPr>
+            <p:ph type="sldNum" sz="quarter" idx="10"/>
+          </p:nvPr>
+        </p:nvSpPr>
+        <p:spPr/>
+        <p:txBody>
+          <a:bodyPr/>
+          <a:lstStyle/>
+          <a:p>
+            <a:fld id="{ABEEAED5-6BB0-3543-A175-5FEF91939696}" type="slidenum">
+              <a:rPr lang="en-US" smtClean="0"/>
+              <a:t>27</a:t>
+            </a:fld>
+            <a:endParaRPr lang="en-US"/>
+          </a:p>
+        </p:txBody>
+      </p:sp>
+    </p:spTree>
+    <p:extLst>
+      <p:ext uri="{BB962C8B-B14F-4D97-AF65-F5344CB8AC3E}">
+        <p14:creationId xmlns:p14="http://schemas.microsoft.com/office/powerpoint/2010/main" val="2463484984"/>
+      </p:ext>
+    </p:extLst>
+  </p:cSld>
+  <p:clrMapOvr>
+    <a:masterClrMapping/>
+  </p:clrMapOvr>
+</p:notes>
+</file>
+
+<file path=ppt/notesSlides/notesSlide25.xml><?xml version="1.0" encoding="utf-8"?>
+<p:notes xmlns:a="http://schemas.openxmlformats.org/drawingml/2006/main" xmlns:r="http://schemas.openxmlformats.org/officeDocument/2006/relationships" xmlns:p="http://schemas.openxmlformats.org/presentationml/2006/main">
+  <p:cSld>
+    <p:spTree>
+      <p:nvGrpSpPr>
+        <p:cNvPr id="1" name=""/>
+        <p:cNvGrpSpPr/>
+        <p:nvPr/>
+      </p:nvGrpSpPr>
+      <p:grpSpPr>
+        <a:xfrm>
+          <a:off x="0" y="0"/>
+          <a:ext cx="0" cy="0"/>
+          <a:chOff x="0" y="0"/>
+          <a:chExt cx="0" cy="0"/>
+        </a:xfrm>
+      </p:grpSpPr>
+      <p:sp>
+        <p:nvSpPr>
+          <p:cNvPr id="2" name="Slide Image Placeholder 1"/>
+          <p:cNvSpPr>
+            <a:spLocks noGrp="1" noRot="1" noChangeAspect="1"/>
+          </p:cNvSpPr>
+          <p:nvPr>
+            <p:ph type="sldImg"/>
+          </p:nvPr>
+        </p:nvSpPr>
+        <p:spPr/>
+      </p:sp>
+      <p:sp>
+        <p:nvSpPr>
+          <p:cNvPr id="3" name="Notes Placeholder 2"/>
+          <p:cNvSpPr>
+            <a:spLocks noGrp="1"/>
+          </p:cNvSpPr>
+          <p:nvPr>
+            <p:ph type="body" idx="1"/>
+          </p:nvPr>
+        </p:nvSpPr>
+        <p:spPr/>
+        <p:txBody>
+          <a:bodyPr/>
+          <a:lstStyle/>
+          <a:p>
+            <a:r>
+              <a:rPr lang="en-US" dirty="0" smtClean="0"/>
+              <a:t>Here’s some very very basic code using python-</a:t>
+            </a:r>
+            <a:r>
+              <a:rPr lang="en-US" dirty="0" err="1" smtClean="0"/>
+              <a:t>gnupg</a:t>
+            </a:r>
+            <a:r>
+              <a:rPr lang="en-US" dirty="0" smtClean="0"/>
+              <a:t> and the </a:t>
+            </a:r>
+            <a:r>
+              <a:rPr lang="en-US" dirty="0" err="1" smtClean="0"/>
+              <a:t>gpg</a:t>
+            </a:r>
+            <a:r>
+              <a:rPr lang="en-US" dirty="0" smtClean="0"/>
+              <a:t>-agent to load </a:t>
+            </a:r>
+            <a:r>
+              <a:rPr lang="en-US" dirty="0" err="1" smtClean="0"/>
+              <a:t>cleartext</a:t>
+            </a:r>
+            <a:r>
+              <a:rPr lang="en-US" dirty="0" smtClean="0"/>
+              <a:t> from </a:t>
+            </a:r>
+            <a:r>
+              <a:rPr lang="en-US" dirty="0" err="1" smtClean="0"/>
+              <a:t>ciphertext</a:t>
+            </a:r>
+            <a:r>
+              <a:rPr lang="en-US" dirty="0" smtClean="0"/>
+              <a:t> on disk using an in-memory key. I’m working</a:t>
+            </a:r>
+            <a:r>
+              <a:rPr lang="en-US" baseline="0" dirty="0" smtClean="0"/>
+              <a:t> on building this out into a more re-usable system, but I hope it gives you some ideas.</a:t>
+            </a:r>
+            <a:endParaRPr lang="en-US" dirty="0"/>
+          </a:p>
+        </p:txBody>
+      </p:sp>
+      <p:sp>
+        <p:nvSpPr>
+          <p:cNvPr id="4" name="Slide Number Placeholder 3"/>
+          <p:cNvSpPr>
+            <a:spLocks noGrp="1"/>
+          </p:cNvSpPr>
+          <p:nvPr>
+            <p:ph type="sldNum" sz="quarter" idx="10"/>
+          </p:nvPr>
+        </p:nvSpPr>
+        <p:spPr/>
+        <p:txBody>
+          <a:bodyPr/>
+          <a:lstStyle/>
+          <a:p>
+            <a:fld id="{ABEEAED5-6BB0-3543-A175-5FEF91939696}" type="slidenum">
+              <a:rPr lang="en-US" smtClean="0"/>
+              <a:t>28</a:t>
+            </a:fld>
+            <a:endParaRPr lang="en-US"/>
+          </a:p>
+        </p:txBody>
+      </p:sp>
+    </p:spTree>
+    <p:extLst>
+      <p:ext uri="{BB962C8B-B14F-4D97-AF65-F5344CB8AC3E}">
+        <p14:creationId xmlns:p14="http://schemas.microsoft.com/office/powerpoint/2010/main" val="707840373"/>
+      </p:ext>
+    </p:extLst>
+  </p:cSld>
+  <p:clrMapOvr>
+    <a:masterClrMapping/>
+  </p:clrMapOvr>
+</p:notes>
+</file>
+
+<file path=ppt/notesSlides/notesSlide26.xml><?xml version="1.0" encoding="utf-8"?>
+<p:notes xmlns:a="http://schemas.openxmlformats.org/drawingml/2006/main" xmlns:r="http://schemas.openxmlformats.org/officeDocument/2006/relationships" xmlns:p="http://schemas.openxmlformats.org/presentationml/2006/main">
+  <p:cSld>
+    <p:spTree>
+      <p:nvGrpSpPr>
+        <p:cNvPr id="1" name=""/>
+        <p:cNvGrpSpPr/>
+        <p:nvPr/>
+      </p:nvGrpSpPr>
+      <p:grpSpPr>
+        <a:xfrm>
+          <a:off x="0" y="0"/>
+          <a:ext cx="0" cy="0"/>
+          <a:chOff x="0" y="0"/>
+          <a:chExt cx="0" cy="0"/>
+        </a:xfrm>
+      </p:grpSpPr>
+      <p:sp>
+        <p:nvSpPr>
+          <p:cNvPr id="2" name="Slide Image Placeholder 1"/>
+          <p:cNvSpPr>
+            <a:spLocks noGrp="1" noRot="1" noChangeAspect="1"/>
+          </p:cNvSpPr>
+          <p:nvPr>
+            <p:ph type="sldImg"/>
+          </p:nvPr>
+        </p:nvSpPr>
+        <p:spPr/>
+      </p:sp>
+      <p:sp>
+        <p:nvSpPr>
+          <p:cNvPr id="3" name="Notes Placeholder 2"/>
+          <p:cNvSpPr>
+            <a:spLocks noGrp="1"/>
+          </p:cNvSpPr>
+          <p:nvPr>
+            <p:ph type="body" idx="1"/>
+          </p:nvPr>
+        </p:nvSpPr>
+        <p:spPr/>
+        <p:txBody>
+          <a:bodyPr/>
+          <a:lstStyle/>
+          <a:p>
+            <a:r>
+              <a:rPr lang="en-US" dirty="0" smtClean="0"/>
+              <a:t>Thanks!</a:t>
+            </a:r>
+            <a:endParaRPr lang="en-US" dirty="0"/>
+          </a:p>
+        </p:txBody>
+      </p:sp>
+      <p:sp>
+        <p:nvSpPr>
+          <p:cNvPr id="4" name="Slide Number Placeholder 3"/>
+          <p:cNvSpPr>
+            <a:spLocks noGrp="1"/>
+          </p:cNvSpPr>
+          <p:nvPr>
+            <p:ph type="sldNum" sz="quarter" idx="10"/>
+          </p:nvPr>
+        </p:nvSpPr>
+        <p:spPr/>
+        <p:txBody>
+          <a:bodyPr/>
+          <a:lstStyle/>
+          <a:p>
+            <a:fld id="{ABEEAED5-6BB0-3543-A175-5FEF91939696}" type="slidenum">
+              <a:rPr lang="en-US" smtClean="0"/>
+              <a:t>29</a:t>
+            </a:fld>
+            <a:endParaRPr lang="en-US"/>
+          </a:p>
+        </p:txBody>
+      </p:sp>
+    </p:spTree>
+    <p:extLst>
+      <p:ext uri="{BB962C8B-B14F-4D97-AF65-F5344CB8AC3E}">
+        <p14:creationId xmlns:p14="http://schemas.microsoft.com/office/powerpoint/2010/main" val="2888599599"/>
       </p:ext>
     </p:extLst>
   </p:cSld>
@@ -8320,7 +10377,70 @@
             </a:r>
             <a:r>
               <a:rPr lang="en-US" baseline="0" dirty="0" smtClean="0"/>
-              <a:t> we go on, let me give you a summary you can write down before going back to IRC. If you leave with nothing else, make sure you leave with these 4 points. First, you have to analyze your risks. It may sound a bureaucratic to say “risk analysis”, but the fact is, you have to understand your risks in order to counter them. On the flip side, if you don’t think about your risks, you’re likely to find yourself vulnerable, and embarrassed. Moving on, crypto is complicated. You do not want to write your own unless you really know what you’re doing. Assuming you need to use crypto, assemble your crypto from components that are known good and operate it correctly. Most of these tools are very good, but without proper operation they lose a lot of their effectiveness. Finally, commit to keeping up. Technology, and crypto in particular, are complicated and the landscape changes all the time. Once you’ve gone down this road, you need to commit to keeping up-to-date.</a:t>
+              <a:t> we go on, let me give you a summary you can write down before going back to IRC. If you leave with nothing else, </a:t>
+            </a:r>
+            <a:r>
+              <a:rPr lang="en-US" baseline="0" dirty="0" smtClean="0"/>
+              <a:t>I hope you </a:t>
+            </a:r>
+            <a:r>
+              <a:rPr lang="en-US" baseline="0" dirty="0" smtClean="0"/>
+              <a:t>leave with these 4 points. First, you have to analyze your risks. It may sound a bureaucratic to say “risk analysis”, but the fact is, you have to understand your risks in order to counter them. On the flip side, if you don’t think about your risks, you’re likely to find yourself vulnerable, and embarrassed. </a:t>
+            </a:r>
+            <a:endParaRPr lang="en-US" baseline="0" dirty="0" smtClean="0"/>
+          </a:p>
+          <a:p>
+            <a:endParaRPr lang="en-US" baseline="0" dirty="0" smtClean="0"/>
+          </a:p>
+          <a:p>
+            <a:r>
+              <a:rPr lang="en-US" baseline="0" dirty="0" smtClean="0"/>
+              <a:t>Moving </a:t>
+            </a:r>
+            <a:r>
+              <a:rPr lang="en-US" baseline="0" dirty="0" smtClean="0"/>
+              <a:t>on, crypto is complicated. You do not want to write your own unless you really know what you’re doing. </a:t>
+            </a:r>
+            <a:endParaRPr lang="en-US" baseline="0" dirty="0" smtClean="0"/>
+          </a:p>
+          <a:p>
+            <a:endParaRPr lang="en-US" baseline="0" dirty="0" smtClean="0"/>
+          </a:p>
+          <a:p>
+            <a:r>
+              <a:rPr lang="en-US" baseline="0" dirty="0" smtClean="0"/>
+              <a:t>Assuming </a:t>
+            </a:r>
+            <a:r>
+              <a:rPr lang="en-US" baseline="0" dirty="0" smtClean="0"/>
+              <a:t>you need to use crypto, assemble your crypto from components that are known good and operate it correctly. Most of these tools are very good, but without proper operation they lose a lot of their effectiveness. </a:t>
+            </a:r>
+            <a:endParaRPr lang="en-US" baseline="0" dirty="0" smtClean="0"/>
+          </a:p>
+          <a:p>
+            <a:endParaRPr lang="en-US" baseline="0" dirty="0" smtClean="0"/>
+          </a:p>
+          <a:p>
+            <a:r>
+              <a:rPr lang="en-US" baseline="0" dirty="0" smtClean="0"/>
+              <a:t>Finally</a:t>
+            </a:r>
+            <a:r>
+              <a:rPr lang="en-US" baseline="0" dirty="0" smtClean="0"/>
+              <a:t>, commit to keeping up. Technology, and crypto in particular, are complicated and the landscape changes all the time. Once you’ve gone down this road, you need to commit to keeping up-to-date</a:t>
+            </a:r>
+            <a:r>
+              <a:rPr lang="en-US" baseline="0" dirty="0" smtClean="0"/>
+              <a:t>.</a:t>
+            </a:r>
+          </a:p>
+          <a:p>
+            <a:endParaRPr lang="en-US" baseline="0" dirty="0" smtClean="0"/>
+          </a:p>
+          <a:p>
+            <a:r>
+              <a:rPr lang="en-US" baseline="0" dirty="0" smtClean="0"/>
+              <a:t>Oh, and please use a password manager!</a:t>
             </a:r>
             <a:endParaRPr lang="en-US" dirty="0"/>
           </a:p>
@@ -8408,37 +10528,39 @@
           <a:p>
             <a:r>
               <a:rPr lang="en-US" dirty="0" smtClean="0"/>
-              <a:t>Lest</a:t>
+              <a:t>So, here I am telling you not to, it’s hard, you have to keep up, blah blah blah. Why do you care?</a:t>
+            </a:r>
+          </a:p>
+          <a:p>
+            <a:endParaRPr lang="en-US" dirty="0" smtClean="0"/>
+          </a:p>
+          <a:p>
+            <a:r>
+              <a:rPr lang="en-US" dirty="0" smtClean="0"/>
+              <a:t>There’s one big reason. It’s really easy to do it wrong. And apparently it</a:t>
             </a:r>
             <a:r>
               <a:rPr lang="en-US" baseline="0" dirty="0" smtClean="0"/>
-              <a:t> we assume that all these issues are modern and, take a look this fascinating article at Wikipedia. The enigma machine was cracked, basically, because of lack of training and carelessness on the part of the </a:t>
-            </a:r>
-            <a:r>
-              <a:rPr lang="en-US" baseline="0" dirty="0" err="1" smtClean="0"/>
-              <a:t>german</a:t>
-            </a:r>
+              <a:t> happens a lot. If you haven’t, you really need to be familiar with the OWASP Top 10. You’ll be interested to see that rule number A7 is “Insecure Cryptographic Storage”. </a:t>
+            </a:r>
+          </a:p>
+          <a:p>
+            <a:endParaRPr lang="en-US" baseline="0" dirty="0" smtClean="0"/>
+          </a:p>
+          <a:p>
             <a:r>
               <a:rPr lang="en-US" baseline="0" dirty="0" smtClean="0"/>
-              <a:t> operators.</a:t>
-            </a:r>
-            <a:endParaRPr lang="en-US" dirty="0" smtClean="0"/>
-          </a:p>
-          <a:p>
-            <a:pPr lvl="2"/>
-            <a:r>
-              <a:rPr lang="en-US" dirty="0" smtClean="0"/>
-              <a:t>re-used message keys (initialization vectors)</a:t>
-            </a:r>
-          </a:p>
-          <a:p>
-            <a:pPr lvl="2"/>
-            <a:r>
-              <a:rPr lang="en-US" dirty="0" smtClean="0"/>
-              <a:t>re-used messages </a:t>
-            </a:r>
-          </a:p>
-          <a:p>
+              <a:t>Unfortunately, for crypto, the correct usage is … a little … harder than for a chainsaw. But chainsaws still come with these cool warning decals. Hmm.</a:t>
+            </a:r>
+          </a:p>
+          <a:p>
+            <a:endParaRPr lang="en-US" baseline="0" dirty="0" smtClean="0"/>
+          </a:p>
+          <a:p>
+            <a:r>
+              <a:rPr lang="en-US" baseline="0" dirty="0" smtClean="0"/>
+              <a:t>So, let’s look at a few recent events.</a:t>
+            </a:r>
             <a:endParaRPr lang="en-US" dirty="0"/>
           </a:p>
         </p:txBody>
@@ -8460,7 +10582,7 @@
           <a:p>
             <a:fld id="{ABEEAED5-6BB0-3543-A175-5FEF91939696}" type="slidenum">
               <a:rPr lang="en-US" smtClean="0"/>
-              <a:t>7</a:t>
+              <a:t>4</a:t>
             </a:fld>
             <a:endParaRPr lang="en-US"/>
           </a:p>
@@ -8469,7 +10591,7 @@
     </p:spTree>
     <p:extLst>
       <p:ext uri="{BB962C8B-B14F-4D97-AF65-F5344CB8AC3E}">
-        <p14:creationId xmlns:p14="http://schemas.microsoft.com/office/powerpoint/2010/main" val="889734038"/>
+        <p14:creationId xmlns:p14="http://schemas.microsoft.com/office/powerpoint/2010/main" val="985562834"/>
       </p:ext>
     </p:extLst>
   </p:cSld>
@@ -8525,11 +10647,63 @@
           <a:p>
             <a:r>
               <a:rPr lang="en-US" dirty="0" smtClean="0"/>
-              <a:t>Didn’t use Django. Stuck with an outdated</a:t>
+              <a:t>Some</a:t>
             </a:r>
             <a:r>
               <a:rPr lang="en-US" baseline="0" dirty="0" smtClean="0"/>
-              <a:t> hash algorithm and key size (crypt).</a:t>
+              <a:t> of you are probably gamers. If not, you probably heard about this anyway. Sony got owned. Hard. Over and over again. I’m not sure if they even estimated the cost of the damage, but I’m sure it was huge.</a:t>
+            </a:r>
+          </a:p>
+          <a:p>
+            <a:endParaRPr lang="en-US" baseline="0" dirty="0" smtClean="0"/>
+          </a:p>
+          <a:p>
+            <a:r>
+              <a:rPr lang="en-US" baseline="0" dirty="0" smtClean="0"/>
+              <a:t>The particularly ironic thing about this story is that in at least some of the leaks they hadn’t even attempted to obscure the passwords. This is what risk analysis is supposed to help with.</a:t>
+            </a:r>
+          </a:p>
+          <a:p>
+            <a:endParaRPr lang="en-US" baseline="0" dirty="0" smtClean="0"/>
+          </a:p>
+          <a:p>
+            <a:r>
+              <a:rPr lang="en-US" baseline="0" dirty="0" smtClean="0"/>
+              <a:t>James </a:t>
+            </a:r>
+            <a:r>
+              <a:rPr lang="en-US" baseline="0" dirty="0" err="1" smtClean="0"/>
+              <a:t>Sokol</a:t>
+            </a:r>
+            <a:r>
+              <a:rPr lang="en-US" baseline="0" dirty="0" smtClean="0"/>
+              <a:t> from Mozilla did a great introduction to security best practices talk yesterday and said they expect their database dumps to end up on the internet. So should you. </a:t>
+            </a:r>
+          </a:p>
+          <a:p>
+            <a:endParaRPr lang="en-US" baseline="0" dirty="0" smtClean="0"/>
+          </a:p>
+          <a:p>
+            <a:r>
+              <a:rPr lang="en-US" baseline="0" dirty="0" smtClean="0"/>
+              <a:t>(This just in, this week anonymous posted over a million apple </a:t>
+            </a:r>
+            <a:r>
+              <a:rPr lang="en-US" baseline="0" dirty="0" err="1" smtClean="0"/>
+              <a:t>udid</a:t>
+            </a:r>
+            <a:r>
+              <a:rPr lang="en-US" baseline="0" dirty="0" smtClean="0"/>
+              <a:t> records, with names. They are claiming they got them from the FBI).</a:t>
+            </a:r>
+          </a:p>
+          <a:p>
+            <a:endParaRPr lang="en-US" baseline="0" dirty="0" smtClean="0"/>
+          </a:p>
+          <a:p>
+            <a:r>
+              <a:rPr lang="en-US" baseline="0" dirty="0" smtClean="0"/>
+              <a:t>Oh, by the way. You should be using a password manager!</a:t>
             </a:r>
             <a:endParaRPr lang="en-US" dirty="0"/>
           </a:p>
@@ -8552,7 +10726,7 @@
           <a:p>
             <a:fld id="{ABEEAED5-6BB0-3543-A175-5FEF91939696}" type="slidenum">
               <a:rPr lang="en-US" smtClean="0"/>
-              <a:t>8</a:t>
+              <a:t>5</a:t>
             </a:fld>
             <a:endParaRPr lang="en-US"/>
           </a:p>
@@ -8561,7 +10735,7 @@
     </p:spTree>
     <p:extLst>
       <p:ext uri="{BB962C8B-B14F-4D97-AF65-F5344CB8AC3E}">
-        <p14:creationId xmlns:p14="http://schemas.microsoft.com/office/powerpoint/2010/main" val="698102791"/>
+        <p14:creationId xmlns:p14="http://schemas.microsoft.com/office/powerpoint/2010/main" val="1118846486"/>
       </p:ext>
     </p:extLst>
   </p:cSld>
@@ -8615,37 +10789,32 @@
           <a:bodyPr/>
           <a:lstStyle/>
           <a:p>
-            <a:pPr marL="285750" indent="-285750">
-              <a:buFont typeface="Arial"/>
-              <a:buChar char="•"/>
-            </a:pPr>
             <a:r>
               <a:rPr lang="en-US" dirty="0" smtClean="0"/>
-              <a:t>N0 Keys</a:t>
-            </a:r>
-          </a:p>
-          <a:p>
-            <a:pPr marL="285750" indent="-285750">
-              <a:buFont typeface="Arial"/>
-              <a:buChar char="•"/>
-            </a:pPr>
-            <a:r>
-              <a:rPr lang="en-US" dirty="0" smtClean="0"/>
-              <a:t>One way (destroys data)</a:t>
-            </a:r>
-          </a:p>
-          <a:p>
-            <a:pPr marL="285750" indent="-285750">
-              <a:buFont typeface="Arial"/>
-              <a:buChar char="•"/>
-            </a:pPr>
-            <a:r>
-              <a:rPr lang="en-US" dirty="0" smtClean="0"/>
-              <a:t>Comparatively fast (still not ideal for hash tables)</a:t>
-            </a:r>
-          </a:p>
-          <a:p>
-            <a:endParaRPr lang="en-US" dirty="0"/>
+              <a:t>Again,</a:t>
+            </a:r>
+            <a:r>
+              <a:rPr lang="en-US" baseline="0" dirty="0" smtClean="0"/>
+              <a:t> perhaps a few of you guys have heard of linked-in. At least they actually TRIED to obscure their passwords with a hash. The problem is, they didn’t really do it right, and so their entire database is susceptible to brute force in one pass.</a:t>
+            </a:r>
+          </a:p>
+          <a:p>
+            <a:endParaRPr lang="en-US" baseline="0" dirty="0" smtClean="0"/>
+          </a:p>
+          <a:p>
+            <a:r>
+              <a:rPr lang="en-US" baseline="0" dirty="0" smtClean="0"/>
+              <a:t>The good news is if they’d been using Django, this wouldn’t have been an issue!</a:t>
+            </a:r>
+          </a:p>
+          <a:p>
+            <a:endParaRPr lang="en-US" baseline="0" dirty="0" smtClean="0"/>
+          </a:p>
+          <a:p>
+            <a:r>
+              <a:rPr lang="en-US" baseline="0" dirty="0" smtClean="0"/>
+              <a:t>By the way, try out a password manager!</a:t>
+            </a:r>
           </a:p>
         </p:txBody>
       </p:sp>
@@ -8666,7 +10835,7 @@
           <a:p>
             <a:fld id="{ABEEAED5-6BB0-3543-A175-5FEF91939696}" type="slidenum">
               <a:rPr lang="en-US" smtClean="0"/>
-              <a:t>12</a:t>
+              <a:t>6</a:t>
             </a:fld>
             <a:endParaRPr lang="en-US"/>
           </a:p>
@@ -8675,7 +10844,7 @@
     </p:spTree>
     <p:extLst>
       <p:ext uri="{BB962C8B-B14F-4D97-AF65-F5344CB8AC3E}">
-        <p14:creationId xmlns:p14="http://schemas.microsoft.com/office/powerpoint/2010/main" val="206127257"/>
+        <p14:creationId xmlns:p14="http://schemas.microsoft.com/office/powerpoint/2010/main" val="2638862053"/>
       </p:ext>
     </p:extLst>
   </p:cSld>
@@ -8731,8 +10900,37 @@
           <a:p>
             <a:r>
               <a:rPr lang="en-US" dirty="0" smtClean="0"/>
-              <a:t>The initialization vector is a key piece here. </a:t>
-            </a:r>
+              <a:t>Lest</a:t>
+            </a:r>
+            <a:r>
+              <a:rPr lang="en-US" baseline="0" dirty="0" smtClean="0"/>
+              <a:t> we assume that all these issues are modern and, take a look this fascinating article at Wikipedia. The enigma machine was cracked, basically, because of lack of training and carelessness on the part of the </a:t>
+            </a:r>
+            <a:r>
+              <a:rPr lang="en-US" baseline="0" dirty="0" err="1" smtClean="0"/>
+              <a:t>german</a:t>
+            </a:r>
+            <a:r>
+              <a:rPr lang="en-US" baseline="0" dirty="0" smtClean="0"/>
+              <a:t> operators.</a:t>
+            </a:r>
+            <a:endParaRPr lang="en-US" dirty="0" smtClean="0"/>
+          </a:p>
+          <a:p>
+            <a:pPr lvl="2"/>
+            <a:r>
+              <a:rPr lang="en-US" dirty="0" smtClean="0"/>
+              <a:t>re-used message keys (initialization vectors)</a:t>
+            </a:r>
+          </a:p>
+          <a:p>
+            <a:pPr lvl="2"/>
+            <a:r>
+              <a:rPr lang="en-US" dirty="0" smtClean="0"/>
+              <a:t>re-used messages </a:t>
+            </a:r>
+          </a:p>
+          <a:p>
             <a:endParaRPr lang="en-US" dirty="0"/>
           </a:p>
         </p:txBody>
@@ -8754,7 +10952,7 @@
           <a:p>
             <a:fld id="{ABEEAED5-6BB0-3543-A175-5FEF91939696}" type="slidenum">
               <a:rPr lang="en-US" smtClean="0"/>
-              <a:t>25</a:t>
+              <a:t>7</a:t>
             </a:fld>
             <a:endParaRPr lang="en-US"/>
           </a:p>
@@ -8763,7 +10961,279 @@
     </p:spTree>
     <p:extLst>
       <p:ext uri="{BB962C8B-B14F-4D97-AF65-F5344CB8AC3E}">
-        <p14:creationId xmlns:p14="http://schemas.microsoft.com/office/powerpoint/2010/main" val="4088174744"/>
+        <p14:creationId xmlns:p14="http://schemas.microsoft.com/office/powerpoint/2010/main" val="889734038"/>
+      </p:ext>
+    </p:extLst>
+  </p:cSld>
+  <p:clrMapOvr>
+    <a:masterClrMapping/>
+  </p:clrMapOvr>
+</p:notes>
+</file>
+
+<file path=ppt/notesSlides/notesSlide8.xml><?xml version="1.0" encoding="utf-8"?>
+<p:notes xmlns:a="http://schemas.openxmlformats.org/drawingml/2006/main" xmlns:r="http://schemas.openxmlformats.org/officeDocument/2006/relationships" xmlns:p="http://schemas.openxmlformats.org/presentationml/2006/main">
+  <p:cSld>
+    <p:spTree>
+      <p:nvGrpSpPr>
+        <p:cNvPr id="1" name=""/>
+        <p:cNvGrpSpPr/>
+        <p:nvPr/>
+      </p:nvGrpSpPr>
+      <p:grpSpPr>
+        <a:xfrm>
+          <a:off x="0" y="0"/>
+          <a:ext cx="0" cy="0"/>
+          <a:chOff x="0" y="0"/>
+          <a:chExt cx="0" cy="0"/>
+        </a:xfrm>
+      </p:grpSpPr>
+      <p:sp>
+        <p:nvSpPr>
+          <p:cNvPr id="2" name="Slide Image Placeholder 1"/>
+          <p:cNvSpPr>
+            <a:spLocks noGrp="1" noRot="1" noChangeAspect="1"/>
+          </p:cNvSpPr>
+          <p:nvPr>
+            <p:ph type="sldImg"/>
+          </p:nvPr>
+        </p:nvSpPr>
+        <p:spPr/>
+      </p:sp>
+      <p:sp>
+        <p:nvSpPr>
+          <p:cNvPr id="3" name="Notes Placeholder 2"/>
+          <p:cNvSpPr>
+            <a:spLocks noGrp="1"/>
+          </p:cNvSpPr>
+          <p:nvPr>
+            <p:ph type="body" idx="1"/>
+          </p:nvPr>
+        </p:nvSpPr>
+        <p:spPr/>
+        <p:txBody>
+          <a:bodyPr/>
+          <a:lstStyle/>
+          <a:p>
+            <a:pPr marL="0" marR="0" indent="0" algn="l" defTabSz="457200" rtl="0" eaLnBrk="1" fontAlgn="auto" latinLnBrk="0" hangingPunct="1">
+              <a:lnSpc>
+                <a:spcPct val="100000"/>
+              </a:lnSpc>
+              <a:spcBef>
+                <a:spcPts val="0"/>
+              </a:spcBef>
+              <a:spcAft>
+                <a:spcPts val="0"/>
+              </a:spcAft>
+              <a:buClrTx/>
+              <a:buSzTx/>
+              <a:buFontTx/>
+              <a:buNone/>
+              <a:tabLst/>
+              <a:defRPr/>
+            </a:pPr>
+            <a:r>
+              <a:rPr lang="en-US" dirty="0" smtClean="0"/>
+              <a:t>So, I’m not entirely sure what</a:t>
+            </a:r>
+            <a:r>
+              <a:rPr lang="en-US" baseline="0" dirty="0" smtClean="0"/>
+              <a:t> platforms gawker was using, but where they got burned was that they didn’t keep up. They got s</a:t>
+            </a:r>
+            <a:r>
+              <a:rPr lang="en-US" dirty="0" smtClean="0"/>
+              <a:t>tuck with an outdated</a:t>
+            </a:r>
+            <a:r>
+              <a:rPr lang="en-US" baseline="0" dirty="0" smtClean="0"/>
+              <a:t> hash algorithm and key size (crypt), which made it very easy to brute-force the list once somebody had gotten ahold of it.</a:t>
+            </a:r>
+          </a:p>
+          <a:p>
+            <a:pPr marL="0" marR="0" indent="0" algn="l" defTabSz="457200" rtl="0" eaLnBrk="1" fontAlgn="auto" latinLnBrk="0" hangingPunct="1">
+              <a:lnSpc>
+                <a:spcPct val="100000"/>
+              </a:lnSpc>
+              <a:spcBef>
+                <a:spcPts val="0"/>
+              </a:spcBef>
+              <a:spcAft>
+                <a:spcPts val="0"/>
+              </a:spcAft>
+              <a:buClrTx/>
+              <a:buSzTx/>
+              <a:buFontTx/>
+              <a:buNone/>
+              <a:tabLst/>
+              <a:defRPr/>
+            </a:pPr>
+            <a:endParaRPr lang="en-US" dirty="0" smtClean="0"/>
+          </a:p>
+          <a:p>
+            <a:r>
+              <a:rPr lang="en-US" baseline="0" dirty="0" smtClean="0"/>
+              <a:t>Inertia can be really tough to overcome, but if you don’t, rest assured that </a:t>
+            </a:r>
+            <a:r>
+              <a:rPr lang="en-US" baseline="0" dirty="0" err="1" smtClean="0"/>
+              <a:t>moore’s</a:t>
+            </a:r>
+            <a:r>
+              <a:rPr lang="en-US" baseline="0" dirty="0" smtClean="0"/>
+              <a:t> law will catch up to you.</a:t>
+            </a:r>
+          </a:p>
+          <a:p>
+            <a:endParaRPr lang="en-US" baseline="0" dirty="0" smtClean="0"/>
+          </a:p>
+          <a:p>
+            <a:r>
+              <a:rPr lang="en-US" baseline="0" dirty="0" smtClean="0"/>
+              <a:t>Again, this is a good reason to use D</a:t>
+            </a:r>
+            <a:r>
+              <a:rPr lang="en-US" dirty="0" smtClean="0"/>
+              <a:t>jango and keep up.. </a:t>
+            </a:r>
+            <a:endParaRPr lang="en-US" dirty="0"/>
+          </a:p>
+        </p:txBody>
+      </p:sp>
+      <p:sp>
+        <p:nvSpPr>
+          <p:cNvPr id="4" name="Slide Number Placeholder 3"/>
+          <p:cNvSpPr>
+            <a:spLocks noGrp="1"/>
+          </p:cNvSpPr>
+          <p:nvPr>
+            <p:ph type="sldNum" sz="quarter" idx="10"/>
+          </p:nvPr>
+        </p:nvSpPr>
+        <p:spPr/>
+        <p:txBody>
+          <a:bodyPr/>
+          <a:lstStyle/>
+          <a:p>
+            <a:fld id="{ABEEAED5-6BB0-3543-A175-5FEF91939696}" type="slidenum">
+              <a:rPr lang="en-US" smtClean="0"/>
+              <a:t>8</a:t>
+            </a:fld>
+            <a:endParaRPr lang="en-US"/>
+          </a:p>
+        </p:txBody>
+      </p:sp>
+    </p:spTree>
+    <p:extLst>
+      <p:ext uri="{BB962C8B-B14F-4D97-AF65-F5344CB8AC3E}">
+        <p14:creationId xmlns:p14="http://schemas.microsoft.com/office/powerpoint/2010/main" val="698102791"/>
+      </p:ext>
+    </p:extLst>
+  </p:cSld>
+  <p:clrMapOvr>
+    <a:masterClrMapping/>
+  </p:clrMapOvr>
+</p:notes>
+</file>
+
+<file path=ppt/notesSlides/notesSlide9.xml><?xml version="1.0" encoding="utf-8"?>
+<p:notes xmlns:a="http://schemas.openxmlformats.org/drawingml/2006/main" xmlns:r="http://schemas.openxmlformats.org/officeDocument/2006/relationships" xmlns:p="http://schemas.openxmlformats.org/presentationml/2006/main">
+  <p:cSld>
+    <p:spTree>
+      <p:nvGrpSpPr>
+        <p:cNvPr id="1" name=""/>
+        <p:cNvGrpSpPr/>
+        <p:nvPr/>
+      </p:nvGrpSpPr>
+      <p:grpSpPr>
+        <a:xfrm>
+          <a:off x="0" y="0"/>
+          <a:ext cx="0" cy="0"/>
+          <a:chOff x="0" y="0"/>
+          <a:chExt cx="0" cy="0"/>
+        </a:xfrm>
+      </p:grpSpPr>
+      <p:sp>
+        <p:nvSpPr>
+          <p:cNvPr id="2" name="Slide Image Placeholder 1"/>
+          <p:cNvSpPr>
+            <a:spLocks noGrp="1" noRot="1" noChangeAspect="1"/>
+          </p:cNvSpPr>
+          <p:nvPr>
+            <p:ph type="sldImg"/>
+          </p:nvPr>
+        </p:nvSpPr>
+        <p:spPr/>
+      </p:sp>
+      <p:sp>
+        <p:nvSpPr>
+          <p:cNvPr id="3" name="Notes Placeholder 2"/>
+          <p:cNvSpPr>
+            <a:spLocks noGrp="1"/>
+          </p:cNvSpPr>
+          <p:nvPr>
+            <p:ph type="body" idx="1"/>
+          </p:nvPr>
+        </p:nvSpPr>
+        <p:spPr/>
+        <p:txBody>
+          <a:bodyPr/>
+          <a:lstStyle/>
+          <a:p>
+            <a:r>
+              <a:rPr lang="en-US" dirty="0" smtClean="0"/>
+              <a:t>Finally, all of this stuff counts because there are a lot of smart people out there making it REALLY</a:t>
+            </a:r>
+            <a:r>
+              <a:rPr lang="en-US" baseline="0" dirty="0" smtClean="0"/>
+              <a:t> easy to exploit any flaws that are found. </a:t>
+            </a:r>
+            <a:r>
+              <a:rPr lang="en-US" baseline="0" dirty="0" err="1" smtClean="0"/>
+              <a:t>FireSheep</a:t>
+            </a:r>
+            <a:r>
+              <a:rPr lang="en-US" baseline="0" dirty="0" smtClean="0"/>
+              <a:t> is perhaps the most </a:t>
+            </a:r>
+            <a:r>
+              <a:rPr lang="en-US" baseline="0" dirty="0" err="1" smtClean="0"/>
+              <a:t>egregrious</a:t>
+            </a:r>
+            <a:r>
+              <a:rPr lang="en-US" baseline="0" dirty="0" smtClean="0"/>
+              <a:t> example of this, at least, lately, but it’s going on all the time. It’s an arms race, and if you’re on the internet, you’re in it.</a:t>
+            </a:r>
+            <a:endParaRPr lang="en-US" dirty="0"/>
+          </a:p>
+        </p:txBody>
+      </p:sp>
+      <p:sp>
+        <p:nvSpPr>
+          <p:cNvPr id="4" name="Slide Number Placeholder 3"/>
+          <p:cNvSpPr>
+            <a:spLocks noGrp="1"/>
+          </p:cNvSpPr>
+          <p:nvPr>
+            <p:ph type="sldNum" sz="quarter" idx="10"/>
+          </p:nvPr>
+        </p:nvSpPr>
+        <p:spPr/>
+        <p:txBody>
+          <a:bodyPr/>
+          <a:lstStyle/>
+          <a:p>
+            <a:fld id="{ABEEAED5-6BB0-3543-A175-5FEF91939696}" type="slidenum">
+              <a:rPr lang="en-US" smtClean="0"/>
+              <a:t>9</a:t>
+            </a:fld>
+            <a:endParaRPr lang="en-US"/>
+          </a:p>
+        </p:txBody>
+      </p:sp>
+    </p:spTree>
+    <p:extLst>
+      <p:ext uri="{BB962C8B-B14F-4D97-AF65-F5344CB8AC3E}">
+        <p14:creationId xmlns:p14="http://schemas.microsoft.com/office/powerpoint/2010/main" val="619017649"/>
       </p:ext>
     </p:extLst>
   </p:cSld>
@@ -12907,19 +15377,19 @@
             <a:pPr marL="400050"/>
             <a:r>
               <a:rPr lang="en-US" sz="2500" dirty="0" smtClean="0">
-                <a:hlinkClick r:id="rId2"/>
+                <a:hlinkClick r:id="rId3"/>
               </a:rPr>
               <a:t>http</a:t>
             </a:r>
             <a:r>
               <a:rPr lang="en-US" sz="2500" dirty="0">
-                <a:hlinkClick r:id="rId2"/>
+                <a:hlinkClick r:id="rId3"/>
               </a:rPr>
               <a:t>://csrc.nist.gov/publications/nistpubs/800-30/sp800-30.</a:t>
             </a:r>
             <a:r>
               <a:rPr lang="en-US" sz="2500" dirty="0" smtClean="0">
-                <a:hlinkClick r:id="rId2"/>
+                <a:hlinkClick r:id="rId3"/>
               </a:rPr>
               <a:t>pdf</a:t>
             </a:r>
@@ -12945,7 +15415,7 @@
           <p:nvPr/>
         </p:nvPicPr>
         <p:blipFill>
-          <a:blip r:embed="rId3"/>
+          <a:blip r:embed="rId4"/>
           <a:stretch>
             <a:fillRect/>
           </a:stretch>
@@ -13557,7 +16027,7 @@
         </p:xfrm>
         <a:graphic>
           <a:graphicData uri="http://schemas.openxmlformats.org/drawingml/2006/diagram">
-            <dgm:relIds xmlns:dgm="http://schemas.openxmlformats.org/drawingml/2006/diagram" xmlns:r="http://schemas.openxmlformats.org/officeDocument/2006/relationships" r:dm="rId2" r:lo="rId3" r:qs="rId4" r:cs="rId5"/>
+            <dgm:relIds xmlns:dgm="http://schemas.openxmlformats.org/drawingml/2006/diagram" xmlns:r="http://schemas.openxmlformats.org/officeDocument/2006/relationships" r:dm="rId3" r:lo="rId4" r:qs="rId5" r:cs="rId6"/>
           </a:graphicData>
         </a:graphic>
       </p:graphicFrame>
@@ -14348,7 +16818,7 @@
           <p:nvPr/>
         </p:nvPicPr>
         <p:blipFill>
-          <a:blip r:embed="rId2"/>
+          <a:blip r:embed="rId3"/>
           <a:stretch>
             <a:fillRect/>
           </a:stretch>
@@ -14372,7 +16842,7 @@
           <p:nvPr/>
         </p:nvPicPr>
         <p:blipFill>
-          <a:blip r:embed="rId3"/>
+          <a:blip r:embed="rId4"/>
           <a:stretch>
             <a:fillRect/>
           </a:stretch>
@@ -14502,7 +16972,7 @@
           <p:nvPr/>
         </p:nvPicPr>
         <p:blipFill>
-          <a:blip r:embed="rId2"/>
+          <a:blip r:embed="rId3"/>
           <a:stretch>
             <a:fillRect/>
           </a:stretch>
@@ -14526,7 +16996,7 @@
           <p:nvPr/>
         </p:nvPicPr>
         <p:blipFill>
-          <a:blip r:embed="rId3"/>
+          <a:blip r:embed="rId4"/>
           <a:stretch>
             <a:fillRect/>
           </a:stretch>
@@ -20759,224 +23229,202 @@
             <p:ph idx="1"/>
           </p:nvPr>
         </p:nvSpPr>
-        <p:spPr/>
+        <p:spPr>
+          <a:xfrm>
+            <a:off x="457200" y="1775193"/>
+            <a:ext cx="8229600" cy="5061144"/>
+          </a:xfrm>
+        </p:spPr>
         <p:txBody>
           <a:bodyPr>
-            <a:normAutofit fontScale="92500" lnSpcReduction="10000"/>
+            <a:normAutofit fontScale="70000" lnSpcReduction="20000"/>
           </a:bodyPr>
           <a:lstStyle/>
-          <a:p>
-            <a:pPr marL="342900" indent="-342900"/>
-            <a:r>
-              <a:rPr lang="en-US" sz="2600" dirty="0" smtClean="0"/>
-              <a:t>Email</a:t>
-            </a:r>
-            <a:r>
-              <a:rPr lang="en-US" sz="2600" dirty="0" smtClean="0"/>
-              <a:t>: </a:t>
-            </a:r>
-            <a:r>
-              <a:rPr lang="en-US" sz="2600" dirty="0" err="1" smtClean="0"/>
-              <a:t>erik.labianca@gmail.com</a:t>
-            </a:r>
-            <a:endParaRPr lang="en-US" sz="2600" dirty="0" smtClean="0"/>
-          </a:p>
-          <a:p>
-            <a:pPr marL="342900" indent="-342900"/>
-            <a:r>
-              <a:rPr lang="en-US" sz="2600" dirty="0" smtClean="0"/>
-              <a:t>Twitter: @easel</a:t>
-            </a:r>
-          </a:p>
-          <a:p>
-            <a:pPr marL="342900" indent="-342900"/>
-            <a:r>
-              <a:rPr lang="en-US" sz="2600" dirty="0" err="1" smtClean="0"/>
-              <a:t>Github</a:t>
-            </a:r>
-            <a:r>
-              <a:rPr lang="en-US" sz="2600" dirty="0" smtClean="0"/>
-              <a:t>: @easel, </a:t>
-            </a:r>
-            <a:r>
-              <a:rPr lang="en-US" sz="2600" dirty="0" smtClean="0"/>
-              <a:t>WiserTogether</a:t>
-            </a:r>
-          </a:p>
-          <a:p>
-            <a:pPr marL="342900" indent="-342900"/>
-            <a:r>
-              <a:rPr lang="en-US" sz="2600" dirty="0" smtClean="0">
-                <a:hlinkClick r:id="rId2"/>
-              </a:rPr>
-              <a:t>http://easel.github.com</a:t>
-            </a:r>
-            <a:r>
-              <a:rPr lang="en-US" sz="2600" smtClean="0">
-                <a:hlinkClick r:id="rId2"/>
-              </a:rPr>
-              <a:t>/talks/django</a:t>
-            </a:r>
-            <a:r>
-              <a:rPr lang="en-US" sz="2600" dirty="0" smtClean="0">
-                <a:hlinkClick r:id="rId2"/>
-              </a:rPr>
-              <a:t>-cryptography.pdf</a:t>
-            </a:r>
-            <a:r>
-              <a:rPr lang="en-US" sz="2600" dirty="0" smtClean="0"/>
-              <a:t>	</a:t>
-            </a:r>
-            <a:endParaRPr lang="en-US" sz="2600" dirty="0" smtClean="0"/>
-          </a:p>
-          <a:p>
-            <a:pPr marL="342900" indent="-342900"/>
-            <a:endParaRPr lang="en-US" sz="2600" dirty="0" smtClean="0"/>
-          </a:p>
           <a:p>
             <a:pPr marL="0" indent="0">
               <a:buNone/>
             </a:pPr>
-            <a:r>
-              <a:rPr lang="en-US" sz="2600" dirty="0" smtClean="0"/>
-              <a:t>Work with us</a:t>
-            </a:r>
-            <a:endParaRPr lang="en-US" sz="2600" dirty="0" smtClean="0"/>
-          </a:p>
-          <a:p>
-            <a:pPr marL="342900" indent="-342900"/>
-            <a:r>
-              <a:rPr lang="en-US" sz="2600" dirty="0" smtClean="0">
-                <a:hlinkClick r:id="rId3"/>
-              </a:rPr>
-              <a:t>http://wisertogether.com/careers/</a:t>
-            </a:r>
-            <a:r>
-              <a:rPr lang="en-US" sz="2600" dirty="0" smtClean="0"/>
-              <a:t>			</a:t>
-            </a:r>
-            <a:endParaRPr lang="en-US" sz="2000" dirty="0" smtClean="0"/>
+            <a:endParaRPr lang="en-US" dirty="0" smtClean="0">
+              <a:hlinkClick r:id="rId3"/>
+            </a:endParaRPr>
           </a:p>
           <a:p>
             <a:pPr marL="0" indent="0">
               <a:buNone/>
             </a:pPr>
-            <a:endParaRPr lang="en-US" sz="2000" dirty="0" smtClean="0"/>
-          </a:p>
-          <a:p>
-            <a:endParaRPr lang="en-US" sz="2000" dirty="0" smtClean="0"/>
+            <a:endParaRPr lang="en-US" dirty="0">
+              <a:hlinkClick r:id="rId3"/>
+            </a:endParaRPr>
           </a:p>
           <a:p>
             <a:pPr marL="0" indent="0">
               <a:buNone/>
             </a:pPr>
             <a:r>
-              <a:rPr lang="en-US" sz="2000" dirty="0" smtClean="0"/>
+              <a:rPr lang="en-US" dirty="0" smtClean="0"/>
+              <a:t>Work </a:t>
+            </a:r>
+            <a:r>
+              <a:rPr lang="en-US" dirty="0"/>
+              <a:t>With </a:t>
+            </a:r>
+            <a:r>
+              <a:rPr lang="en-US" dirty="0" smtClean="0"/>
+              <a:t>Us</a:t>
+            </a:r>
+            <a:endParaRPr lang="en-US" dirty="0"/>
+          </a:p>
+          <a:p>
+            <a:pPr marL="457200" indent="-457200"/>
+            <a:r>
+              <a:rPr lang="en-US" dirty="0"/>
+              <a:t>http://wisertogether.com/careers/	</a:t>
+            </a:r>
+          </a:p>
+          <a:p>
+            <a:pPr marL="457200" indent="-457200"/>
+            <a:r>
+              <a:rPr lang="en-US" dirty="0"/>
+              <a:t>https://github.com/WiserTogether/	</a:t>
+            </a:r>
+          </a:p>
+          <a:p>
+            <a:pPr marL="0" indent="0">
+              <a:buNone/>
+            </a:pPr>
+            <a:endParaRPr lang="en-US" dirty="0"/>
+          </a:p>
+          <a:p>
+            <a:pPr marL="0" indent="0">
+              <a:buNone/>
+            </a:pPr>
+            <a:r>
+              <a:rPr lang="en-US" dirty="0"/>
+              <a:t>Contact Me</a:t>
+            </a:r>
+          </a:p>
+          <a:p>
+            <a:pPr marL="457200" indent="-457200"/>
+            <a:r>
+              <a:rPr lang="en-US" dirty="0"/>
+              <a:t>mailto:erik.labianca@gmail.com	</a:t>
+            </a:r>
+          </a:p>
+          <a:p>
+            <a:pPr marL="457200" indent="-457200"/>
+            <a:r>
+              <a:rPr lang="en-US" dirty="0"/>
+              <a:t>https://twitter.com/easel/	</a:t>
+            </a:r>
+          </a:p>
+          <a:p>
+            <a:pPr marL="457200" indent="-457200"/>
+            <a:r>
+              <a:rPr lang="en-US" dirty="0"/>
+              <a:t>https://github.com/easel/	</a:t>
+            </a:r>
+          </a:p>
+          <a:p>
+            <a:pPr marL="457200" indent="-457200"/>
+            <a:r>
+              <a:rPr lang="en-US" dirty="0"/>
+              <a:t>https://easel.github.com/talks/django-cryptography.pdf	</a:t>
+            </a:r>
+          </a:p>
+          <a:p>
+            <a:pPr marL="118872" indent="0">
+              <a:buNone/>
+            </a:pPr>
+            <a:endParaRPr lang="en-US" dirty="0"/>
+          </a:p>
+          <a:p>
+            <a:pPr marL="0" indent="0">
+              <a:buNone/>
+            </a:pPr>
+            <a:r>
+              <a:rPr lang="en-US" dirty="0"/>
               <a:t>Other Resources</a:t>
             </a:r>
-            <a:endParaRPr lang="en-US" sz="2000" dirty="0"/>
-          </a:p>
-          <a:p>
-            <a:r>
-              <a:rPr lang="en-US" sz="2000" dirty="0" smtClean="0">
-                <a:hlinkClick r:id="rId4"/>
-              </a:rPr>
+            <a:endParaRPr lang="en-US" dirty="0"/>
+          </a:p>
+          <a:p>
+            <a:r>
+              <a:rPr lang="en-US" dirty="0"/>
               <a:t>http</a:t>
             </a:r>
             <a:r>
-              <a:rPr lang="en-US" sz="2000" dirty="0">
-                <a:hlinkClick r:id="rId4"/>
-              </a:rPr>
+              <a:rPr lang="en-US" dirty="0"/>
               <a:t>://www.kyleisom.net/downloads/</a:t>
             </a:r>
             <a:r>
-              <a:rPr lang="en-US" sz="2000" dirty="0" smtClean="0">
-                <a:hlinkClick r:id="rId4"/>
-              </a:rPr>
-              <a:t>crypto_intro.pdf</a:t>
-            </a:r>
-            <a:r>
-              <a:rPr lang="en-US" sz="2000" dirty="0" smtClean="0"/>
-              <a:t>	</a:t>
-            </a:r>
-            <a:endParaRPr lang="en-US" sz="2000" dirty="0"/>
-          </a:p>
-          <a:p>
-            <a:r>
-              <a:rPr lang="en-US" sz="2000" dirty="0">
-                <a:hlinkClick r:id="rId5"/>
-              </a:rPr>
+              <a:rPr lang="en-US" dirty="0"/>
+              <a:t>crypto_intro.pdf	</a:t>
+            </a:r>
+            <a:endParaRPr lang="en-US" dirty="0"/>
+          </a:p>
+          <a:p>
+            <a:r>
+              <a:rPr lang="en-US" dirty="0"/>
               <a:t>http://www.garykessler.net/library/</a:t>
             </a:r>
             <a:r>
-              <a:rPr lang="en-US" sz="2000" dirty="0" smtClean="0">
-                <a:hlinkClick r:id="rId5"/>
-              </a:rPr>
+              <a:rPr lang="en-US" dirty="0"/>
               <a:t>crypto.html</a:t>
             </a:r>
-            <a:endParaRPr lang="en-US" sz="2000" dirty="0" smtClean="0"/>
-          </a:p>
-          <a:p>
-            <a:r>
-              <a:rPr lang="en-US" sz="2000" dirty="0">
-                <a:hlinkClick r:id="rId6"/>
-              </a:rPr>
-              <a:t>http://code.google.com/p/python-gnupg</a:t>
-            </a:r>
-            <a:r>
-              <a:rPr lang="en-US" sz="2000" dirty="0" smtClean="0">
-                <a:hlinkClick r:id="rId6"/>
-              </a:rPr>
-              <a:t>/</a:t>
-            </a:r>
-            <a:r>
-              <a:rPr lang="en-US" sz="2000" dirty="0" smtClean="0"/>
-              <a:t>	</a:t>
-            </a:r>
-          </a:p>
-          <a:p>
-            <a:r>
-              <a:rPr lang="en-US" sz="2000" dirty="0">
-                <a:hlinkClick r:id="rId7"/>
-              </a:rPr>
-              <a:t>http://chandlerproject.org/Projects/</a:t>
-            </a:r>
-            <a:r>
-              <a:rPr lang="en-US" sz="2000" dirty="0" smtClean="0">
-                <a:hlinkClick r:id="rId7"/>
-              </a:rPr>
-              <a:t>MeTooCrypto</a:t>
-            </a:r>
-            <a:endParaRPr lang="en-US" sz="2000" dirty="0" smtClean="0"/>
-          </a:p>
-          <a:p>
-            <a:r>
-              <a:rPr lang="en-US" sz="2000" dirty="0">
-                <a:hlinkClick r:id="rId8"/>
-              </a:rPr>
-              <a:t>https://www.dlitz.net/software/pycrypto</a:t>
-            </a:r>
-            <a:r>
-              <a:rPr lang="en-US" sz="2000" dirty="0" smtClean="0">
-                <a:hlinkClick r:id="rId8"/>
-              </a:rPr>
-              <a:t>/</a:t>
-            </a:r>
-            <a:r>
-              <a:rPr lang="en-US" sz="2000" dirty="0" smtClean="0"/>
-              <a:t>	</a:t>
-            </a:r>
-            <a:r>
-              <a:rPr lang="en-US" sz="2000" dirty="0"/>
-              <a:t>	</a:t>
-            </a:r>
-            <a:endParaRPr lang="en-US" sz="2000" dirty="0" smtClean="0"/>
+          </a:p>
+          <a:p>
+            <a:r>
+              <a:rPr lang="en-US" dirty="0"/>
+              <a:t>http://code.google.com/p/python-gnupg/	</a:t>
+            </a:r>
+          </a:p>
+          <a:p>
+            <a:r>
+              <a:rPr lang="en-US" dirty="0"/>
+              <a:t>http://chandlerproject.org/Projects/MeTooCrypto</a:t>
+            </a:r>
+          </a:p>
+          <a:p>
+            <a:r>
+              <a:rPr lang="en-US" dirty="0"/>
+              <a:t>https://www.dlitz.net/software/pycrypto/		</a:t>
+            </a:r>
           </a:p>
           <a:p>
             <a:endParaRPr lang="en-US" dirty="0"/>
           </a:p>
         </p:txBody>
       </p:sp>
+      <p:pic>
+        <p:nvPicPr>
+          <p:cNvPr id="5" name="Picture 4" descr="wisertogether-H-tagline.eps"/>
+          <p:cNvPicPr>
+            <a:picLocks noChangeAspect="1"/>
+          </p:cNvPicPr>
+          <p:nvPr/>
+        </p:nvPicPr>
+        <p:blipFill>
+          <a:blip r:embed="rId4">
+            <a:extLst>
+              <a:ext uri="{28A0092B-C50C-407E-A947-70E740481C1C}">
+                <a14:useLocalDpi xmlns:a14="http://schemas.microsoft.com/office/drawing/2010/main" val="0"/>
+              </a:ext>
+            </a:extLst>
+          </a:blip>
+          <a:stretch>
+            <a:fillRect/>
+          </a:stretch>
+        </p:blipFill>
+        <p:spPr>
+          <a:xfrm>
+            <a:off x="3184569" y="1775193"/>
+            <a:ext cx="3289300" cy="736600"/>
+          </a:xfrm>
+          <a:prstGeom prst="rect">
+            <a:avLst/>
+          </a:prstGeom>
+        </p:spPr>
+      </p:pic>
     </p:spTree>
     <p:extLst>
       <p:ext uri="{BB962C8B-B14F-4D97-AF65-F5344CB8AC3E}">
@@ -21223,8 +23671,13 @@
             <a:pPr lvl="1"/>
             <a:r>
               <a:rPr lang="en-US" dirty="0" smtClean="0"/>
-              <a:t>OWASP Top-10 A7: Insecure Crypto Storage</a:t>
-            </a:r>
+              <a:t>OWASP Top-10 A7: Insecure </a:t>
+            </a:r>
+            <a:r>
+              <a:rPr lang="en-US" dirty="0" smtClean="0"/>
+              <a:t>Cryptography</a:t>
+            </a:r>
+            <a:endParaRPr lang="en-US" dirty="0" smtClean="0"/>
           </a:p>
         </p:txBody>
       </p:sp>
@@ -21237,7 +23690,7 @@
           <p:nvPr/>
         </p:nvPicPr>
         <p:blipFill>
-          <a:blip r:embed="rId2"/>
+          <a:blip r:embed="rId3"/>
           <a:stretch>
             <a:fillRect/>
           </a:stretch>
@@ -21298,7 +23751,7 @@
           <p:nvPr/>
         </p:nvPicPr>
         <p:blipFill>
-          <a:blip r:embed="rId2">
+          <a:blip r:embed="rId3">
             <a:extLst>
               <a:ext uri="{28A0092B-C50C-407E-A947-70E740481C1C}">
                 <a14:useLocalDpi xmlns:a14="http://schemas.microsoft.com/office/drawing/2010/main" val="0"/>
@@ -21343,12 +23796,8 @@
           <a:p>
             <a:pPr algn="ctr"/>
             <a:r>
-              <a:rPr lang="en-US" sz="2400" dirty="0"/>
-              <a:t>(please use a password manager</a:t>
-            </a:r>
-            <a:r>
               <a:rPr lang="en-US" sz="2400" dirty="0" smtClean="0"/>
-              <a:t>)</a:t>
+              <a:t>(unique passwords are cool)</a:t>
             </a:r>
             <a:endParaRPr lang="en-US" sz="2400" dirty="0"/>
           </a:p>
@@ -21430,7 +23879,7 @@
           <p:nvPr/>
         </p:nvPicPr>
         <p:blipFill>
-          <a:blip r:embed="rId2">
+          <a:blip r:embed="rId3">
             <a:extLst>
               <a:ext uri="{28A0092B-C50C-407E-A947-70E740481C1C}">
                 <a14:useLocalDpi xmlns:a14="http://schemas.microsoft.com/office/drawing/2010/main" val="0"/>
@@ -21475,8 +23924,12 @@
           <a:p>
             <a:pPr algn="ctr"/>
             <a:r>
+              <a:rPr lang="en-US" sz="2400" dirty="0" smtClean="0"/>
+              <a:t>(try out a password </a:t>
+            </a:r>
+            <a:r>
               <a:rPr lang="en-US" sz="2400" dirty="0"/>
-              <a:t>(please use a password manager</a:t>
+              <a:t>manager</a:t>
             </a:r>
             <a:r>
               <a:rPr lang="en-US" sz="2400" dirty="0" smtClean="0"/>
@@ -21870,7 +24323,7 @@
           <p:nvPr/>
         </p:nvPicPr>
         <p:blipFill>
-          <a:blip r:embed="rId2">
+          <a:blip r:embed="rId3">
             <a:extLst>
               <a:ext uri="{28A0092B-C50C-407E-A947-70E740481C1C}">
                 <a14:useLocalDpi xmlns:a14="http://schemas.microsoft.com/office/drawing/2010/main" val="0"/>

</xml_diff>